<commit_message>
added Insurance Examples including Geojson
</commit_message>
<xml_diff>
--- a/fsh/ig-data/input/images/patterns.pptx
+++ b/fsh/ig-data/input/images/patterns.pptx
@@ -18,8 +18,7 @@
     <p:sldId id="1291" r:id="rId12"/>
     <p:sldId id="1292" r:id="rId13"/>
     <p:sldId id="1294" r:id="rId14"/>
-    <p:sldId id="1293" r:id="rId15"/>
-    <p:sldId id="1295" r:id="rId16"/>
+    <p:sldId id="1296" r:id="rId15"/>
   </p:sldIdLst>
   <p:sldSz cx="12192000" cy="6858000"/>
   <p:notesSz cx="6858000" cy="9144000"/>
@@ -3357,7 +3356,7 @@
           <a:lstStyle/>
           <a:p>
             <a:r>
-              <a:rPr lang="en-US"/>
+              <a:rPr lang="en-US" dirty="0"/>
               <a:t>Plan-Net Patterns</a:t>
             </a:r>
           </a:p>
@@ -8726,7 +8725,7 @@
                   <a:srgbClr val="FF0000"/>
                 </a:solidFill>
               </a:rPr>
-              <a:t>XYZ Insurance</a:t>
+              <a:t>Acme of CT</a:t>
             </a:r>
             <a:br>
               <a:rPr lang="en-US" sz="1600" dirty="0">
@@ -8821,7 +8820,7 @@
                   <a:schemeClr val="tx1"/>
                 </a:solidFill>
               </a:rPr>
-              <a:t>XYZ CT </a:t>
+              <a:t>Acme of CT </a:t>
             </a:r>
             <a:br>
               <a:rPr lang="en-US" sz="1400" dirty="0">
@@ -8836,7 +8835,7 @@
                   <a:schemeClr val="tx1"/>
                 </a:solidFill>
               </a:rPr>
-              <a:t>Network</a:t>
+              <a:t>Standard Network </a:t>
             </a:r>
             <a:endParaRPr lang="en-US" dirty="0">
               <a:solidFill>
@@ -9651,7 +9650,7 @@
             </a:br>
             <a:r>
               <a:rPr lang="en-US" dirty="0"/>
-              <a:t>ABC QHP Bronze</a:t>
+              <a:t>Acme QHP Plans</a:t>
             </a:r>
             <a:br>
               <a:rPr lang="en-US" dirty="0"/>
@@ -9674,7 +9673,7 @@
         </p:nvSpPr>
         <p:spPr>
           <a:xfrm>
-            <a:off x="5521118" y="1903149"/>
+            <a:off x="7176857" y="2006678"/>
             <a:ext cx="2023463" cy="1422322"/>
           </a:xfrm>
           <a:prstGeom prst="roundRect">
@@ -9732,10 +9731,10 @@
             <a:r>
               <a:rPr lang="en-US" sz="1600" dirty="0">
                 <a:solidFill>
-                  <a:srgbClr val="FF0000"/>
-                </a:solidFill>
-              </a:rPr>
-              <a:t>ABC</a:t>
+                  <a:schemeClr val="tx1"/>
+                </a:solidFill>
+              </a:rPr>
+              <a:t>Acme of CT</a:t>
             </a:r>
             <a:br>
               <a:rPr lang="en-US" sz="1600" dirty="0">
@@ -9773,7 +9772,7 @@
         </p:nvSpPr>
         <p:spPr>
           <a:xfrm>
-            <a:off x="2441609" y="2075876"/>
+            <a:off x="4328079" y="1563979"/>
             <a:ext cx="1766667" cy="1437620"/>
           </a:xfrm>
           <a:prstGeom prst="roundRect">
@@ -9830,7 +9829,7 @@
                   <a:schemeClr val="tx1"/>
                 </a:solidFill>
               </a:rPr>
-              <a:t>ABC Bronze Network</a:t>
+              <a:t>Acme of CT Standard Network</a:t>
             </a:r>
             <a:endParaRPr lang="en-US" dirty="0">
               <a:solidFill>
@@ -9865,7 +9864,7 @@
         </p:nvCxnSpPr>
         <p:spPr>
           <a:xfrm flipV="1">
-            <a:off x="3497601" y="3325471"/>
+            <a:off x="5153340" y="3429000"/>
             <a:ext cx="3035249" cy="1518452"/>
           </a:xfrm>
           <a:prstGeom prst="straightConnector1">
@@ -9908,8 +9907,8 @@
         </p:nvSpPr>
         <p:spPr>
           <a:xfrm>
-            <a:off x="1556298" y="4352622"/>
-            <a:ext cx="3642038" cy="1437620"/>
+            <a:off x="2781582" y="4352622"/>
+            <a:ext cx="2416754" cy="2140253"/>
           </a:xfrm>
           <a:prstGeom prst="roundRect">
             <a:avLst/>
@@ -9966,7 +9965,7 @@
                   <a:srgbClr val="002060"/>
                 </a:solidFill>
               </a:rPr>
-              <a:t>Name: ABC QHP</a:t>
+              <a:t>Name: Acme QHP</a:t>
             </a:r>
           </a:p>
           <a:p>
@@ -9994,15 +9993,7 @@
                   <a:srgbClr val="002060"/>
                 </a:solidFill>
               </a:rPr>
-              <a:t>: Bronze   </a:t>
-            </a:r>
-            <a:r>
-              <a:rPr lang="en-US" sz="1600" dirty="0">
-                <a:solidFill>
-                  <a:srgbClr val="FF0000"/>
-                </a:solidFill>
-              </a:rPr>
-              <a:t>(Make MS in IG)</a:t>
+              <a:t>: Bronze</a:t>
             </a:r>
           </a:p>
           <a:p>
@@ -10032,14 +10023,15 @@
           </p:cNvPr>
           <p:cNvCxnSpPr>
             <a:cxnSpLocks/>
+            <a:stCxn id="9" idx="0"/>
             <a:endCxn id="5" idx="2"/>
           </p:cNvCxnSpPr>
           <p:nvPr/>
         </p:nvCxnSpPr>
         <p:spPr>
           <a:xfrm flipV="1">
-            <a:off x="3242064" y="3513496"/>
-            <a:ext cx="82879" cy="839128"/>
+            <a:off x="3989959" y="3001599"/>
+            <a:ext cx="1221454" cy="1351023"/>
           </a:xfrm>
           <a:prstGeom prst="straightConnector1">
             <a:avLst/>
@@ -10081,7 +10073,7 @@
         </p:nvSpPr>
         <p:spPr>
           <a:xfrm>
-            <a:off x="5567618" y="3770829"/>
+            <a:off x="5894739" y="3818894"/>
             <a:ext cx="1056764" cy="369332"/>
           </a:xfrm>
           <a:prstGeom prst="rect">
@@ -10200,7 +10192,7 @@
                   <a:sysClr val="windowText" lastClr="000000"/>
                 </a:solidFill>
               </a:rPr>
-              <a:t>:  shape of CT</a:t>
+              <a:t>:  shape of CT </a:t>
             </a:r>
           </a:p>
           <a:p>
@@ -10210,7 +10202,7 @@
                   <a:sysClr val="windowText" lastClr="000000"/>
                 </a:solidFill>
               </a:rPr>
-              <a:t>Address: CT </a:t>
+              <a:t>Address: CT</a:t>
             </a:r>
             <a:br>
               <a:rPr lang="en-US" sz="1600" dirty="0">
@@ -10253,7 +10245,7 @@
         <p:spPr>
           <a:xfrm flipV="1">
             <a:off x="5198336" y="4352622"/>
-            <a:ext cx="3737965" cy="718810"/>
+            <a:ext cx="3737965" cy="1070127"/>
           </a:xfrm>
           <a:prstGeom prst="straightConnector1">
             <a:avLst/>
@@ -10399,12 +10391,20 @@
               </a:rPr>
             </a:br>
             <a:r>
-              <a:rPr lang="en-US" sz="1200" dirty="0" err="1">
-                <a:solidFill>
-                  <a:sysClr val="windowText" lastClr="000000"/>
-                </a:solidFill>
-              </a:rPr>
-              <a:t>name:BlueShield</a:t>
+              <a:rPr lang="en-US" sz="1200" err="1">
+                <a:solidFill>
+                  <a:sysClr val="windowText" lastClr="000000"/>
+                </a:solidFill>
+              </a:rPr>
+              <a:t>name</a:t>
+            </a:r>
+            <a:r>
+              <a:rPr lang="en-US" sz="1200">
+                <a:solidFill>
+                  <a:sysClr val="windowText" lastClr="000000"/>
+                </a:solidFill>
+              </a:rPr>
+              <a:t>:Acme </a:t>
             </a:r>
             <a:r>
               <a:rPr lang="en-US" sz="1200" dirty="0">
@@ -10412,7 +10412,7 @@
                   <a:sysClr val="windowText" lastClr="000000"/>
                 </a:solidFill>
               </a:rPr>
-              <a:t> Portal</a:t>
+              <a:t>Portal</a:t>
             </a:r>
           </a:p>
           <a:p>
@@ -10566,8 +10566,8 @@
         </p:nvCxnSpPr>
         <p:spPr>
           <a:xfrm>
-            <a:off x="5198336" y="5196754"/>
-            <a:ext cx="1978519" cy="870784"/>
+            <a:off x="5153340" y="5705216"/>
+            <a:ext cx="2023515" cy="362322"/>
           </a:xfrm>
           <a:prstGeom prst="straightConnector1">
             <a:avLst/>
@@ -10630,93 +10630,22 @@
           </a:p>
         </p:txBody>
       </p:sp>
-    </p:spTree>
-    <p:extLst>
-      <p:ext uri="{BB962C8B-B14F-4D97-AF65-F5344CB8AC3E}">
-        <p14:creationId xmlns:p14="http://schemas.microsoft.com/office/powerpoint/2010/main" val="1419802205"/>
-      </p:ext>
-    </p:extLst>
-  </p:cSld>
-  <p:clrMapOvr>
-    <a:masterClrMapping/>
-  </p:clrMapOvr>
-</p:sld>
-</file>
-
-<file path=ppt/slides/slide15.xml><?xml version="1.0" encoding="utf-8"?>
-<p:sld xmlns:a="http://schemas.openxmlformats.org/drawingml/2006/main" xmlns:r="http://schemas.openxmlformats.org/officeDocument/2006/relationships" xmlns:p="http://schemas.openxmlformats.org/presentationml/2006/main">
-  <p:cSld>
-    <p:spTree>
-      <p:nvGrpSpPr>
-        <p:cNvPr id="1" name=""/>
-        <p:cNvGrpSpPr/>
-        <p:nvPr/>
-      </p:nvGrpSpPr>
-      <p:grpSpPr>
-        <a:xfrm>
-          <a:off x="0" y="0"/>
-          <a:ext cx="0" cy="0"/>
-          <a:chOff x="0" y="0"/>
-          <a:chExt cx="0" cy="0"/>
-        </a:xfrm>
-      </p:grpSpPr>
       <p:sp>
         <p:nvSpPr>
-          <p:cNvPr id="2" name="Title 1">
-            <a:extLst>
-              <a:ext uri="{FF2B5EF4-FFF2-40B4-BE49-F238E27FC236}">
-                <a16:creationId xmlns:a16="http://schemas.microsoft.com/office/drawing/2014/main" id="{C00684E4-7C9B-AA49-B32C-5B4E5AF44C4A}"/>
-              </a:ext>
-            </a:extLst>
-          </p:cNvPr>
-          <p:cNvSpPr>
-            <a:spLocks noGrp="1"/>
-          </p:cNvSpPr>
-          <p:nvPr>
-            <p:ph type="title"/>
-          </p:nvPr>
+          <p:cNvPr id="18" name="Rounded Rectangle 17">
+            <a:extLst>
+              <a:ext uri="{FF2B5EF4-FFF2-40B4-BE49-F238E27FC236}">
+                <a16:creationId xmlns:a16="http://schemas.microsoft.com/office/drawing/2014/main" id="{88BF1B1E-5C0B-EC4D-8544-B6AB05537A3A}"/>
+              </a:ext>
+            </a:extLst>
+          </p:cNvPr>
+          <p:cNvSpPr/>
+          <p:nvPr/>
         </p:nvSpPr>
-        <p:spPr/>
-        <p:txBody>
-          <a:bodyPr>
-            <a:normAutofit fontScale="90000"/>
-          </a:bodyPr>
-          <a:lstStyle/>
-          <a:p>
-            <a:r>
-              <a:rPr lang="en-US" dirty="0"/>
-              <a:t>Insurance Plan and Network.  #2</a:t>
-            </a:r>
-            <a:br>
-              <a:rPr lang="en-US" dirty="0"/>
-            </a:br>
-            <a:r>
-              <a:rPr lang="en-US" dirty="0"/>
-              <a:t>Cigna QHP Platinum</a:t>
-            </a:r>
-            <a:br>
-              <a:rPr lang="en-US" dirty="0"/>
-            </a:br>
-            <a:endParaRPr lang="en-US" dirty="0"/>
-          </a:p>
-        </p:txBody>
-      </p:sp>
-      <p:sp>
-        <p:nvSpPr>
-          <p:cNvPr id="4" name="Rounded Rectangle 3">
-            <a:extLst>
-              <a:ext uri="{FF2B5EF4-FFF2-40B4-BE49-F238E27FC236}">
-                <a16:creationId xmlns:a16="http://schemas.microsoft.com/office/drawing/2014/main" id="{DC9DB60D-12AB-0641-ADBD-33FFE79021BD}"/>
-              </a:ext>
-            </a:extLst>
-          </p:cNvPr>
-          <p:cNvSpPr/>
-          <p:nvPr/>
-        </p:nvSpPr>
         <p:spPr>
           <a:xfrm>
-            <a:off x="7176857" y="2006678"/>
-            <a:ext cx="2023463" cy="1422322"/>
+            <a:off x="368836" y="2075876"/>
+            <a:ext cx="1766667" cy="1437620"/>
           </a:xfrm>
           <a:prstGeom prst="roundRect">
             <a:avLst/>
@@ -10753,105 +10682,6 @@
                   <a:sysClr val="windowText" lastClr="000000"/>
                 </a:solidFill>
               </a:rPr>
-              <a:t>Organization</a:t>
-            </a:r>
-            <a:br>
-              <a:rPr lang="en-US" sz="1600" u="sng" dirty="0">
-                <a:solidFill>
-                  <a:sysClr val="windowText" lastClr="000000"/>
-                </a:solidFill>
-              </a:rPr>
-            </a:br>
-            <a:r>
-              <a:rPr lang="en-US" sz="1600" dirty="0">
-                <a:solidFill>
-                  <a:sysClr val="windowText" lastClr="000000"/>
-                </a:solidFill>
-              </a:rPr>
-              <a:t>name: </a:t>
-            </a:r>
-            <a:r>
-              <a:rPr lang="en-US" sz="1600" dirty="0">
-                <a:solidFill>
-                  <a:srgbClr val="FF0000"/>
-                </a:solidFill>
-              </a:rPr>
-              <a:t>CIGNA</a:t>
-            </a:r>
-            <a:br>
-              <a:rPr lang="en-US" sz="1600" dirty="0">
-                <a:solidFill>
-                  <a:sysClr val="windowText" lastClr="000000"/>
-                </a:solidFill>
-              </a:rPr>
-            </a:br>
-            <a:br>
-              <a:rPr lang="en-US" sz="1600" dirty="0">
-                <a:solidFill>
-                  <a:sysClr val="windowText" lastClr="000000"/>
-                </a:solidFill>
-              </a:rPr>
-            </a:br>
-            <a:endParaRPr lang="en-US" sz="1600" dirty="0">
-              <a:solidFill>
-                <a:sysClr val="windowText" lastClr="000000"/>
-              </a:solidFill>
-            </a:endParaRPr>
-          </a:p>
-        </p:txBody>
-      </p:sp>
-      <p:sp>
-        <p:nvSpPr>
-          <p:cNvPr id="5" name="Rounded Rectangle 4">
-            <a:extLst>
-              <a:ext uri="{FF2B5EF4-FFF2-40B4-BE49-F238E27FC236}">
-                <a16:creationId xmlns:a16="http://schemas.microsoft.com/office/drawing/2014/main" id="{19B0E8FE-2DD3-2C44-ABD3-F8AC3E70BF81}"/>
-              </a:ext>
-            </a:extLst>
-          </p:cNvPr>
-          <p:cNvSpPr/>
-          <p:nvPr/>
-        </p:nvSpPr>
-        <p:spPr>
-          <a:xfrm>
-            <a:off x="4328079" y="1563979"/>
-            <a:ext cx="1766667" cy="1437620"/>
-          </a:xfrm>
-          <a:prstGeom prst="roundRect">
-            <a:avLst/>
-          </a:prstGeom>
-          <a:solidFill>
-            <a:schemeClr val="accent1">
-              <a:lumMod val="20000"/>
-              <a:lumOff val="80000"/>
-            </a:schemeClr>
-          </a:solidFill>
-        </p:spPr>
-        <p:style>
-          <a:lnRef idx="1">
-            <a:schemeClr val="accent1"/>
-          </a:lnRef>
-          <a:fillRef idx="3">
-            <a:schemeClr val="accent1"/>
-          </a:fillRef>
-          <a:effectRef idx="2">
-            <a:schemeClr val="accent1"/>
-          </a:effectRef>
-          <a:fontRef idx="minor">
-            <a:schemeClr val="lt1"/>
-          </a:fontRef>
-        </p:style>
-        <p:txBody>
-          <a:bodyPr rtlCol="0" anchor="ctr"/>
-          <a:lstStyle/>
-          <a:p>
-            <a:pPr algn="ctr"/>
-            <a:r>
-              <a:rPr lang="en-US" sz="1600" u="sng" dirty="0">
-                <a:solidFill>
-                  <a:sysClr val="windowText" lastClr="000000"/>
-                </a:solidFill>
-              </a:rPr>
               <a:t>Network</a:t>
             </a:r>
           </a:p>
@@ -10871,7 +10701,7 @@
                   <a:schemeClr val="tx1"/>
                 </a:solidFill>
               </a:rPr>
-              <a:t>CIGNA Standard PPO</a:t>
+              <a:t>Acme of CT Premium Network</a:t>
             </a:r>
             <a:endParaRPr lang="en-US" dirty="0">
               <a:solidFill>
@@ -10891,23 +10721,23 @@
       </p:sp>
       <p:cxnSp>
         <p:nvCxnSpPr>
-          <p:cNvPr id="7" name="Straight Arrow Connector 6">
-            <a:extLst>
-              <a:ext uri="{FF2B5EF4-FFF2-40B4-BE49-F238E27FC236}">
-                <a16:creationId xmlns:a16="http://schemas.microsoft.com/office/drawing/2014/main" id="{C2F4FFF3-369D-C449-9CB8-52BEF8BC41E3}"/>
+          <p:cNvPr id="21" name="Straight Arrow Connector 20">
+            <a:extLst>
+              <a:ext uri="{FF2B5EF4-FFF2-40B4-BE49-F238E27FC236}">
+                <a16:creationId xmlns:a16="http://schemas.microsoft.com/office/drawing/2014/main" id="{8D4A67EF-A1F0-3344-A3C3-4FC8EC13819E}"/>
               </a:ext>
             </a:extLst>
           </p:cNvPr>
           <p:cNvCxnSpPr>
             <a:cxnSpLocks/>
-            <a:endCxn id="4" idx="2"/>
+            <a:stCxn id="17" idx="0"/>
           </p:cNvCxnSpPr>
           <p:nvPr/>
         </p:nvCxnSpPr>
         <p:spPr>
           <a:xfrm flipV="1">
-            <a:off x="5153340" y="3429000"/>
-            <a:ext cx="3035249" cy="1518452"/>
+            <a:off x="1443983" y="2484254"/>
+            <a:ext cx="2884096" cy="1889492"/>
           </a:xfrm>
           <a:prstGeom prst="straightConnector1">
             <a:avLst/>
@@ -10937,10 +10767,10 @@
       </p:cxnSp>
       <p:sp>
         <p:nvSpPr>
-          <p:cNvPr id="9" name="Rounded Rectangle 8">
-            <a:extLst>
-              <a:ext uri="{FF2B5EF4-FFF2-40B4-BE49-F238E27FC236}">
-                <a16:creationId xmlns:a16="http://schemas.microsoft.com/office/drawing/2014/main" id="{6250099D-E2C0-A841-951A-5B319DC8A045}"/>
+          <p:cNvPr id="17" name="Rounded Rectangle 16">
+            <a:extLst>
+              <a:ext uri="{FF2B5EF4-FFF2-40B4-BE49-F238E27FC236}">
+                <a16:creationId xmlns:a16="http://schemas.microsoft.com/office/drawing/2014/main" id="{B9CDBA23-CDA5-A740-AA0B-0B46BEA2DA30}"/>
               </a:ext>
             </a:extLst>
           </p:cNvPr>
@@ -10949,8 +10779,8 @@
         </p:nvSpPr>
         <p:spPr>
           <a:xfrm>
-            <a:off x="2781582" y="4352622"/>
-            <a:ext cx="2416754" cy="2140253"/>
+            <a:off x="123290" y="4373746"/>
+            <a:ext cx="2641385" cy="2140252"/>
           </a:xfrm>
           <a:prstGeom prst="roundRect">
             <a:avLst/>
@@ -11007,871 +10837,7 @@
                   <a:srgbClr val="002060"/>
                 </a:solidFill>
               </a:rPr>
-              <a:t>Name: CIGNA QHP</a:t>
-            </a:r>
-          </a:p>
-          <a:p>
-            <a:r>
-              <a:rPr lang="en-US" sz="1600" dirty="0">
-                <a:solidFill>
-                  <a:srgbClr val="002060"/>
-                </a:solidFill>
-              </a:rPr>
-              <a:t>Type:  QHP</a:t>
-            </a:r>
-          </a:p>
-          <a:p>
-            <a:r>
-              <a:rPr lang="en-US" sz="1600" dirty="0" err="1">
-                <a:solidFill>
-                  <a:srgbClr val="002060"/>
-                </a:solidFill>
-              </a:rPr>
-              <a:t>Plan.type</a:t>
-            </a:r>
-            <a:r>
-              <a:rPr lang="en-US" sz="1600" dirty="0">
-                <a:solidFill>
-                  <a:srgbClr val="002060"/>
-                </a:solidFill>
-              </a:rPr>
-              <a:t>: Bronze</a:t>
-            </a:r>
-          </a:p>
-          <a:p>
-            <a:br>
-              <a:rPr lang="en-US" sz="1600" dirty="0">
-                <a:solidFill>
-                  <a:sysClr val="windowText" lastClr="000000"/>
-                </a:solidFill>
-              </a:rPr>
-            </a:br>
-            <a:endParaRPr lang="en-US" sz="1600" dirty="0">
-              <a:solidFill>
-                <a:sysClr val="windowText" lastClr="000000"/>
-              </a:solidFill>
-            </a:endParaRPr>
-          </a:p>
-        </p:txBody>
-      </p:sp>
-      <p:cxnSp>
-        <p:nvCxnSpPr>
-          <p:cNvPr id="12" name="Straight Arrow Connector 11">
-            <a:extLst>
-              <a:ext uri="{FF2B5EF4-FFF2-40B4-BE49-F238E27FC236}">
-                <a16:creationId xmlns:a16="http://schemas.microsoft.com/office/drawing/2014/main" id="{583D4751-5D65-964B-8195-B66BF71FFACB}"/>
-              </a:ext>
-            </a:extLst>
-          </p:cNvPr>
-          <p:cNvCxnSpPr>
-            <a:cxnSpLocks/>
-            <a:stCxn id="9" idx="0"/>
-            <a:endCxn id="5" idx="2"/>
-          </p:cNvCxnSpPr>
-          <p:nvPr/>
-        </p:nvCxnSpPr>
-        <p:spPr>
-          <a:xfrm flipV="1">
-            <a:off x="3989959" y="3001599"/>
-            <a:ext cx="1221454" cy="1351023"/>
-          </a:xfrm>
-          <a:prstGeom prst="straightConnector1">
-            <a:avLst/>
-          </a:prstGeom>
-          <a:ln>
-            <a:solidFill>
-              <a:srgbClr val="7030A0"/>
-            </a:solidFill>
-            <a:headEnd type="none" w="lg" len="lg"/>
-            <a:tailEnd type="triangle" w="lg" len="lg"/>
-          </a:ln>
-        </p:spPr>
-        <p:style>
-          <a:lnRef idx="2">
-            <a:schemeClr val="accent1"/>
-          </a:lnRef>
-          <a:fillRef idx="0">
-            <a:schemeClr val="accent1"/>
-          </a:fillRef>
-          <a:effectRef idx="1">
-            <a:schemeClr val="accent1"/>
-          </a:effectRef>
-          <a:fontRef idx="minor">
-            <a:schemeClr val="tx1"/>
-          </a:fontRef>
-        </p:style>
-      </p:cxnSp>
-      <p:sp>
-        <p:nvSpPr>
-          <p:cNvPr id="16" name="TextBox 15">
-            <a:extLst>
-              <a:ext uri="{FF2B5EF4-FFF2-40B4-BE49-F238E27FC236}">
-                <a16:creationId xmlns:a16="http://schemas.microsoft.com/office/drawing/2014/main" id="{5D8A8627-B4D0-3F4E-8BD2-E56CEC30BAE3}"/>
-              </a:ext>
-            </a:extLst>
-          </p:cNvPr>
-          <p:cNvSpPr txBox="1"/>
-          <p:nvPr/>
-        </p:nvSpPr>
-        <p:spPr>
-          <a:xfrm>
-            <a:off x="5894739" y="3818894"/>
-            <a:ext cx="1056764" cy="369332"/>
-          </a:xfrm>
-          <a:prstGeom prst="rect">
-            <a:avLst/>
-          </a:prstGeom>
-          <a:noFill/>
-        </p:spPr>
-        <p:txBody>
-          <a:bodyPr wrap="none" rtlCol="0">
-            <a:spAutoFit/>
-          </a:bodyPr>
-          <a:lstStyle/>
-          <a:p>
-            <a:r>
-              <a:rPr lang="en-US" dirty="0" err="1"/>
-              <a:t>ownedBy</a:t>
-            </a:r>
-            <a:endParaRPr lang="en-US" dirty="0"/>
-          </a:p>
-        </p:txBody>
-      </p:sp>
-      <p:sp>
-        <p:nvSpPr>
-          <p:cNvPr id="19" name="Rounded Rectangle 18">
-            <a:extLst>
-              <a:ext uri="{FF2B5EF4-FFF2-40B4-BE49-F238E27FC236}">
-                <a16:creationId xmlns:a16="http://schemas.microsoft.com/office/drawing/2014/main" id="{83D3F637-0007-9F4B-9380-2E7AA2B3CDB7}"/>
-              </a:ext>
-            </a:extLst>
-          </p:cNvPr>
-          <p:cNvSpPr/>
-          <p:nvPr/>
-        </p:nvSpPr>
-        <p:spPr>
-          <a:xfrm>
-            <a:off x="8936301" y="3641461"/>
-            <a:ext cx="2200001" cy="1422322"/>
-          </a:xfrm>
-          <a:prstGeom prst="roundRect">
-            <a:avLst/>
-          </a:prstGeom>
-          <a:solidFill>
-            <a:schemeClr val="accent1">
-              <a:lumMod val="20000"/>
-              <a:lumOff val="80000"/>
-            </a:schemeClr>
-          </a:solidFill>
-        </p:spPr>
-        <p:style>
-          <a:lnRef idx="1">
-            <a:schemeClr val="accent1"/>
-          </a:lnRef>
-          <a:fillRef idx="3">
-            <a:schemeClr val="accent1"/>
-          </a:fillRef>
-          <a:effectRef idx="2">
-            <a:schemeClr val="accent1"/>
-          </a:effectRef>
-          <a:fontRef idx="minor">
-            <a:schemeClr val="lt1"/>
-          </a:fontRef>
-        </p:style>
-        <p:txBody>
-          <a:bodyPr rtlCol="0" anchor="ctr"/>
-          <a:lstStyle/>
-          <a:p>
-            <a:r>
-              <a:rPr lang="en-US" sz="1600" u="sng" dirty="0">
-                <a:solidFill>
-                  <a:sysClr val="windowText" lastClr="000000"/>
-                </a:solidFill>
-              </a:rPr>
-              <a:t>Location</a:t>
-            </a:r>
-            <a:br>
-              <a:rPr lang="en-US" sz="1600" u="sng" dirty="0">
-                <a:solidFill>
-                  <a:sysClr val="windowText" lastClr="000000"/>
-                </a:solidFill>
-              </a:rPr>
-            </a:br>
-            <a:r>
-              <a:rPr lang="en-US" sz="1600" dirty="0">
-                <a:solidFill>
-                  <a:sysClr val="windowText" lastClr="000000"/>
-                </a:solidFill>
-              </a:rPr>
-              <a:t>name: State of CT</a:t>
-            </a:r>
-            <a:br>
-              <a:rPr lang="en-US" sz="1600" dirty="0">
-                <a:solidFill>
-                  <a:sysClr val="windowText" lastClr="000000"/>
-                </a:solidFill>
-              </a:rPr>
-            </a:br>
-            <a:r>
-              <a:rPr lang="en-US" sz="1600" dirty="0">
-                <a:solidFill>
-                  <a:sysClr val="windowText" lastClr="000000"/>
-                </a:solidFill>
-              </a:rPr>
-              <a:t>location-boundary-</a:t>
-            </a:r>
-            <a:r>
-              <a:rPr lang="en-US" sz="1600" dirty="0" err="1">
-                <a:solidFill>
-                  <a:sysClr val="windowText" lastClr="000000"/>
-                </a:solidFill>
-              </a:rPr>
-              <a:t>geojson</a:t>
-            </a:r>
-            <a:r>
-              <a:rPr lang="en-US" sz="1600" dirty="0">
-                <a:solidFill>
-                  <a:sysClr val="windowText" lastClr="000000"/>
-                </a:solidFill>
-              </a:rPr>
-              <a:t>:  shape of CT </a:t>
-            </a:r>
-          </a:p>
-          <a:p>
-            <a:r>
-              <a:rPr lang="en-US" sz="1600" dirty="0">
-                <a:solidFill>
-                  <a:sysClr val="windowText" lastClr="000000"/>
-                </a:solidFill>
-              </a:rPr>
-              <a:t>Address: CT</a:t>
-            </a:r>
-            <a:br>
-              <a:rPr lang="en-US" sz="1600" dirty="0">
-                <a:solidFill>
-                  <a:sysClr val="windowText" lastClr="000000"/>
-                </a:solidFill>
-              </a:rPr>
-            </a:br>
-            <a:br>
-              <a:rPr lang="en-US" sz="1600" dirty="0">
-                <a:solidFill>
-                  <a:sysClr val="windowText" lastClr="000000"/>
-                </a:solidFill>
-              </a:rPr>
-            </a:br>
-            <a:endParaRPr lang="en-US" sz="1600" dirty="0">
-              <a:solidFill>
-                <a:sysClr val="windowText" lastClr="000000"/>
-              </a:solidFill>
-            </a:endParaRPr>
-          </a:p>
-        </p:txBody>
-      </p:sp>
-      <p:cxnSp>
-        <p:nvCxnSpPr>
-          <p:cNvPr id="20" name="Straight Arrow Connector 19">
-            <a:extLst>
-              <a:ext uri="{FF2B5EF4-FFF2-40B4-BE49-F238E27FC236}">
-                <a16:creationId xmlns:a16="http://schemas.microsoft.com/office/drawing/2014/main" id="{847C45E6-682B-5A46-8EFC-991F22351495}"/>
-              </a:ext>
-            </a:extLst>
-          </p:cNvPr>
-          <p:cNvCxnSpPr>
-            <a:cxnSpLocks/>
-            <a:stCxn id="9" idx="3"/>
-            <a:endCxn id="19" idx="1"/>
-          </p:cNvCxnSpPr>
-          <p:nvPr/>
-        </p:nvCxnSpPr>
-        <p:spPr>
-          <a:xfrm flipV="1">
-            <a:off x="5198336" y="4352622"/>
-            <a:ext cx="3737965" cy="1070127"/>
-          </a:xfrm>
-          <a:prstGeom prst="straightConnector1">
-            <a:avLst/>
-          </a:prstGeom>
-          <a:ln>
-            <a:solidFill>
-              <a:srgbClr val="7030A0"/>
-            </a:solidFill>
-            <a:headEnd type="none" w="lg" len="lg"/>
-            <a:tailEnd type="triangle" w="lg" len="lg"/>
-          </a:ln>
-        </p:spPr>
-        <p:style>
-          <a:lnRef idx="2">
-            <a:schemeClr val="accent1"/>
-          </a:lnRef>
-          <a:fillRef idx="0">
-            <a:schemeClr val="accent1"/>
-          </a:fillRef>
-          <a:effectRef idx="1">
-            <a:schemeClr val="accent1"/>
-          </a:effectRef>
-          <a:fontRef idx="minor">
-            <a:schemeClr val="tx1"/>
-          </a:fontRef>
-        </p:style>
-      </p:cxnSp>
-      <p:sp>
-        <p:nvSpPr>
-          <p:cNvPr id="22" name="TextBox 21">
-            <a:extLst>
-              <a:ext uri="{FF2B5EF4-FFF2-40B4-BE49-F238E27FC236}">
-                <a16:creationId xmlns:a16="http://schemas.microsoft.com/office/drawing/2014/main" id="{973B4E06-AF2D-2B4F-BBB3-2848913DE069}"/>
-              </a:ext>
-            </a:extLst>
-          </p:cNvPr>
-          <p:cNvSpPr txBox="1"/>
-          <p:nvPr/>
-        </p:nvSpPr>
-        <p:spPr>
-          <a:xfrm>
-            <a:off x="7004656" y="4140161"/>
-            <a:ext cx="1463414" cy="369332"/>
-          </a:xfrm>
-          <a:prstGeom prst="rect">
-            <a:avLst/>
-          </a:prstGeom>
-          <a:noFill/>
-        </p:spPr>
-        <p:txBody>
-          <a:bodyPr wrap="none" rtlCol="0">
-            <a:spAutoFit/>
-          </a:bodyPr>
-          <a:lstStyle/>
-          <a:p>
-            <a:r>
-              <a:rPr lang="en-US" dirty="0" err="1"/>
-              <a:t>coverageArea</a:t>
-            </a:r>
-            <a:endParaRPr lang="en-US" dirty="0"/>
-          </a:p>
-        </p:txBody>
-      </p:sp>
-      <p:sp>
-        <p:nvSpPr>
-          <p:cNvPr id="24" name="Rounded Rectangle 23">
-            <a:extLst>
-              <a:ext uri="{FF2B5EF4-FFF2-40B4-BE49-F238E27FC236}">
-                <a16:creationId xmlns:a16="http://schemas.microsoft.com/office/drawing/2014/main" id="{3A205082-FE4B-1945-8B48-9D62442E8F97}"/>
-              </a:ext>
-            </a:extLst>
-          </p:cNvPr>
-          <p:cNvSpPr/>
-          <p:nvPr/>
-        </p:nvSpPr>
-        <p:spPr>
-          <a:xfrm>
-            <a:off x="7176855" y="5356377"/>
-            <a:ext cx="3642037" cy="1422322"/>
-          </a:xfrm>
-          <a:prstGeom prst="roundRect">
-            <a:avLst/>
-          </a:prstGeom>
-          <a:solidFill>
-            <a:schemeClr val="accent1">
-              <a:lumMod val="20000"/>
-              <a:lumOff val="80000"/>
-            </a:schemeClr>
-          </a:solidFill>
-        </p:spPr>
-        <p:style>
-          <a:lnRef idx="1">
-            <a:schemeClr val="accent1"/>
-          </a:lnRef>
-          <a:fillRef idx="3">
-            <a:schemeClr val="accent1"/>
-          </a:fillRef>
-          <a:effectRef idx="2">
-            <a:schemeClr val="accent1"/>
-          </a:effectRef>
-          <a:fontRef idx="minor">
-            <a:schemeClr val="lt1"/>
-          </a:fontRef>
-        </p:style>
-        <p:txBody>
-          <a:bodyPr rtlCol="0" anchor="ctr"/>
-          <a:lstStyle/>
-          <a:p>
-            <a:endParaRPr lang="en-US" sz="1200" u="sng" dirty="0">
-              <a:solidFill>
-                <a:sysClr val="windowText" lastClr="000000"/>
-              </a:solidFill>
-            </a:endParaRPr>
-          </a:p>
-          <a:p>
-            <a:endParaRPr lang="en-US" sz="1200" u="sng" dirty="0">
-              <a:solidFill>
-                <a:sysClr val="windowText" lastClr="000000"/>
-              </a:solidFill>
-            </a:endParaRPr>
-          </a:p>
-          <a:p>
-            <a:endParaRPr lang="en-US" sz="1200" u="sng" dirty="0">
-              <a:solidFill>
-                <a:sysClr val="windowText" lastClr="000000"/>
-              </a:solidFill>
-            </a:endParaRPr>
-          </a:p>
-          <a:p>
-            <a:r>
-              <a:rPr lang="en-US" sz="1200" u="sng" dirty="0">
-                <a:solidFill>
-                  <a:sysClr val="windowText" lastClr="000000"/>
-                </a:solidFill>
-              </a:rPr>
-              <a:t>Endpoint</a:t>
-            </a:r>
-            <a:br>
-              <a:rPr lang="en-US" sz="1200" u="sng" dirty="0">
-                <a:solidFill>
-                  <a:sysClr val="windowText" lastClr="000000"/>
-                </a:solidFill>
-              </a:rPr>
-            </a:br>
-            <a:r>
-              <a:rPr lang="en-US" sz="1200" dirty="0" err="1">
-                <a:solidFill>
-                  <a:sysClr val="windowText" lastClr="000000"/>
-                </a:solidFill>
-              </a:rPr>
-              <a:t>name:BlueShield</a:t>
-            </a:r>
-            <a:r>
-              <a:rPr lang="en-US" sz="1200" dirty="0">
-                <a:solidFill>
-                  <a:sysClr val="windowText" lastClr="000000"/>
-                </a:solidFill>
-              </a:rPr>
-              <a:t> Portal</a:t>
-            </a:r>
-          </a:p>
-          <a:p>
-            <a:r>
-              <a:rPr lang="en-US" sz="1200" dirty="0">
-                <a:solidFill>
-                  <a:sysClr val="windowText" lastClr="000000"/>
-                </a:solidFill>
-              </a:rPr>
-              <a:t>Connection-type: non-</a:t>
-            </a:r>
-            <a:r>
-              <a:rPr lang="en-US" sz="1200" dirty="0" err="1">
-                <a:solidFill>
-                  <a:sysClr val="windowText" lastClr="000000"/>
-                </a:solidFill>
-              </a:rPr>
-              <a:t>fhir</a:t>
-            </a:r>
-            <a:r>
-              <a:rPr lang="en-US" sz="1200" dirty="0">
-                <a:solidFill>
-                  <a:sysClr val="windowText" lastClr="000000"/>
-                </a:solidFill>
-              </a:rPr>
-              <a:t>-rest </a:t>
-            </a:r>
-            <a:br>
-              <a:rPr lang="en-US" sz="1200" dirty="0">
-                <a:solidFill>
-                  <a:sysClr val="windowText" lastClr="000000"/>
-                </a:solidFill>
-              </a:rPr>
-            </a:br>
-            <a:r>
-              <a:rPr lang="en-US" sz="1200" dirty="0" err="1">
-                <a:solidFill>
-                  <a:sysClr val="windowText" lastClr="000000"/>
-                </a:solidFill>
-              </a:rPr>
-              <a:t>payloadtype</a:t>
-            </a:r>
-            <a:r>
-              <a:rPr lang="en-US" sz="1200" dirty="0">
-                <a:solidFill>
-                  <a:sysClr val="windowText" lastClr="000000"/>
-                </a:solidFill>
-              </a:rPr>
-              <a:t>:  NA</a:t>
-            </a:r>
-            <a:br>
-              <a:rPr lang="en-US" sz="1200" dirty="0">
-                <a:solidFill>
-                  <a:sysClr val="windowText" lastClr="000000"/>
-                </a:solidFill>
-              </a:rPr>
-            </a:br>
-            <a:r>
-              <a:rPr lang="en-US" sz="1200" dirty="0">
-                <a:solidFill>
-                  <a:sysClr val="windowText" lastClr="000000"/>
-                </a:solidFill>
-              </a:rPr>
-              <a:t>address:  </a:t>
-            </a:r>
-            <a:r>
-              <a:rPr lang="en-US" sz="1200" dirty="0" err="1">
-                <a:solidFill>
-                  <a:sysClr val="windowText" lastClr="000000"/>
-                </a:solidFill>
-              </a:rPr>
-              <a:t>url</a:t>
-            </a:r>
-            <a:r>
-              <a:rPr lang="en-US" sz="1200" dirty="0">
-                <a:solidFill>
-                  <a:sysClr val="windowText" lastClr="000000"/>
-                </a:solidFill>
-              </a:rPr>
-              <a:t> of portal</a:t>
-            </a:r>
-          </a:p>
-          <a:p>
-            <a:r>
-              <a:rPr lang="en-US" sz="1200" dirty="0" err="1">
-                <a:solidFill>
-                  <a:sysClr val="windowText" lastClr="000000"/>
-                </a:solidFill>
-              </a:rPr>
-              <a:t>Usecase.type</a:t>
-            </a:r>
-            <a:r>
-              <a:rPr lang="en-US" sz="1200" dirty="0">
-                <a:solidFill>
-                  <a:sysClr val="windowText" lastClr="000000"/>
-                </a:solidFill>
-              </a:rPr>
-              <a:t> = HOPERAT</a:t>
-            </a:r>
-            <a:br>
-              <a:rPr lang="en-US" sz="1200" dirty="0">
-                <a:solidFill>
-                  <a:sysClr val="windowText" lastClr="000000"/>
-                </a:solidFill>
-              </a:rPr>
-            </a:br>
-            <a:r>
-              <a:rPr lang="en-US" sz="1600" dirty="0">
-                <a:solidFill>
-                  <a:sysClr val="windowText" lastClr="000000"/>
-                </a:solidFill>
-              </a:rPr>
-              <a:t> </a:t>
-            </a:r>
-            <a:br>
-              <a:rPr lang="en-US" sz="1600" dirty="0">
-                <a:solidFill>
-                  <a:sysClr val="windowText" lastClr="000000"/>
-                </a:solidFill>
-              </a:rPr>
-            </a:br>
-            <a:br>
-              <a:rPr lang="en-US" sz="1600" dirty="0">
-                <a:solidFill>
-                  <a:sysClr val="windowText" lastClr="000000"/>
-                </a:solidFill>
-              </a:rPr>
-            </a:br>
-            <a:endParaRPr lang="en-US" sz="1600" dirty="0">
-              <a:solidFill>
-                <a:sysClr val="windowText" lastClr="000000"/>
-              </a:solidFill>
-            </a:endParaRPr>
-          </a:p>
-        </p:txBody>
-      </p:sp>
-      <p:cxnSp>
-        <p:nvCxnSpPr>
-          <p:cNvPr id="26" name="Straight Arrow Connector 25">
-            <a:extLst>
-              <a:ext uri="{FF2B5EF4-FFF2-40B4-BE49-F238E27FC236}">
-                <a16:creationId xmlns:a16="http://schemas.microsoft.com/office/drawing/2014/main" id="{C6C60C96-A6BA-5645-A849-1F52F6898BD4}"/>
-              </a:ext>
-            </a:extLst>
-          </p:cNvPr>
-          <p:cNvCxnSpPr>
-            <a:cxnSpLocks/>
-            <a:endCxn id="24" idx="1"/>
-          </p:cNvCxnSpPr>
-          <p:nvPr/>
-        </p:nvCxnSpPr>
-        <p:spPr>
-          <a:xfrm>
-            <a:off x="5153340" y="5705216"/>
-            <a:ext cx="2023515" cy="362322"/>
-          </a:xfrm>
-          <a:prstGeom prst="straightConnector1">
-            <a:avLst/>
-          </a:prstGeom>
-          <a:ln>
-            <a:solidFill>
-              <a:srgbClr val="7030A0"/>
-            </a:solidFill>
-            <a:headEnd type="none" w="lg" len="lg"/>
-            <a:tailEnd type="triangle" w="lg" len="lg"/>
-          </a:ln>
-        </p:spPr>
-        <p:style>
-          <a:lnRef idx="2">
-            <a:schemeClr val="accent1"/>
-          </a:lnRef>
-          <a:fillRef idx="0">
-            <a:schemeClr val="accent1"/>
-          </a:fillRef>
-          <a:effectRef idx="1">
-            <a:schemeClr val="accent1"/>
-          </a:effectRef>
-          <a:fontRef idx="minor">
-            <a:schemeClr val="tx1"/>
-          </a:fontRef>
-        </p:style>
-      </p:cxnSp>
-      <p:sp>
-        <p:nvSpPr>
-          <p:cNvPr id="31" name="TextBox 30">
-            <a:extLst>
-              <a:ext uri="{FF2B5EF4-FFF2-40B4-BE49-F238E27FC236}">
-                <a16:creationId xmlns:a16="http://schemas.microsoft.com/office/drawing/2014/main" id="{FA12AEA8-5133-D94A-861C-7FFD42041BB0}"/>
-              </a:ext>
-            </a:extLst>
-          </p:cNvPr>
-          <p:cNvSpPr txBox="1"/>
-          <p:nvPr/>
-        </p:nvSpPr>
-        <p:spPr>
-          <a:xfrm>
-            <a:off x="2221816" y="3714018"/>
-            <a:ext cx="966803" cy="369332"/>
-          </a:xfrm>
-          <a:prstGeom prst="rect">
-            <a:avLst/>
-          </a:prstGeom>
-          <a:noFill/>
-        </p:spPr>
-        <p:txBody>
-          <a:bodyPr wrap="none" rtlCol="0">
-            <a:spAutoFit/>
-          </a:bodyPr>
-          <a:lstStyle/>
-          <a:p>
-            <a:r>
-              <a:rPr lang="en-US" dirty="0"/>
-              <a:t>network</a:t>
-            </a:r>
-          </a:p>
-        </p:txBody>
-      </p:sp>
-      <p:sp>
-        <p:nvSpPr>
-          <p:cNvPr id="18" name="Rounded Rectangle 17">
-            <a:extLst>
-              <a:ext uri="{FF2B5EF4-FFF2-40B4-BE49-F238E27FC236}">
-                <a16:creationId xmlns:a16="http://schemas.microsoft.com/office/drawing/2014/main" id="{88BF1B1E-5C0B-EC4D-8544-B6AB05537A3A}"/>
-              </a:ext>
-            </a:extLst>
-          </p:cNvPr>
-          <p:cNvSpPr/>
-          <p:nvPr/>
-        </p:nvSpPr>
-        <p:spPr>
-          <a:xfrm>
-            <a:off x="368836" y="2075876"/>
-            <a:ext cx="1766667" cy="1437620"/>
-          </a:xfrm>
-          <a:prstGeom prst="roundRect">
-            <a:avLst/>
-          </a:prstGeom>
-          <a:solidFill>
-            <a:schemeClr val="accent1">
-              <a:lumMod val="20000"/>
-              <a:lumOff val="80000"/>
-            </a:schemeClr>
-          </a:solidFill>
-        </p:spPr>
-        <p:style>
-          <a:lnRef idx="1">
-            <a:schemeClr val="accent1"/>
-          </a:lnRef>
-          <a:fillRef idx="3">
-            <a:schemeClr val="accent1"/>
-          </a:fillRef>
-          <a:effectRef idx="2">
-            <a:schemeClr val="accent1"/>
-          </a:effectRef>
-          <a:fontRef idx="minor">
-            <a:schemeClr val="lt1"/>
-          </a:fontRef>
-        </p:style>
-        <p:txBody>
-          <a:bodyPr rtlCol="0" anchor="ctr"/>
-          <a:lstStyle/>
-          <a:p>
-            <a:pPr algn="ctr"/>
-            <a:r>
-              <a:rPr lang="en-US" sz="1600" u="sng" dirty="0">
-                <a:solidFill>
-                  <a:sysClr val="windowText" lastClr="000000"/>
-                </a:solidFill>
-              </a:rPr>
-              <a:t>Network</a:t>
-            </a:r>
-          </a:p>
-          <a:p>
-            <a:pPr algn="ctr"/>
-            <a:endParaRPr lang="en-US" sz="1600" u="sng" dirty="0">
-              <a:solidFill>
-                <a:sysClr val="windowText" lastClr="000000"/>
-              </a:solidFill>
-            </a:endParaRPr>
-          </a:p>
-          <a:p>
-            <a:pPr algn="ctr"/>
-            <a:r>
-              <a:rPr lang="en-US" sz="1400" dirty="0">
-                <a:solidFill>
-                  <a:schemeClr val="tx1"/>
-                </a:solidFill>
-              </a:rPr>
-              <a:t>CIGNA Premium PPO</a:t>
-            </a:r>
-            <a:endParaRPr lang="en-US" dirty="0">
-              <a:solidFill>
-                <a:schemeClr val="tx1"/>
-              </a:solidFill>
-            </a:endParaRPr>
-          </a:p>
-          <a:p>
-            <a:pPr algn="ctr"/>
-            <a:endParaRPr lang="en-US" sz="1600" u="sng" dirty="0">
-              <a:solidFill>
-                <a:sysClr val="windowText" lastClr="000000"/>
-              </a:solidFill>
-            </a:endParaRPr>
-          </a:p>
-        </p:txBody>
-      </p:sp>
-      <p:cxnSp>
-        <p:nvCxnSpPr>
-          <p:cNvPr id="21" name="Straight Arrow Connector 20">
-            <a:extLst>
-              <a:ext uri="{FF2B5EF4-FFF2-40B4-BE49-F238E27FC236}">
-                <a16:creationId xmlns:a16="http://schemas.microsoft.com/office/drawing/2014/main" id="{8D4A67EF-A1F0-3344-A3C3-4FC8EC13819E}"/>
-              </a:ext>
-            </a:extLst>
-          </p:cNvPr>
-          <p:cNvCxnSpPr>
-            <a:cxnSpLocks/>
-            <a:stCxn id="17" idx="0"/>
-          </p:cNvCxnSpPr>
-          <p:nvPr/>
-        </p:nvCxnSpPr>
-        <p:spPr>
-          <a:xfrm flipV="1">
-            <a:off x="1443983" y="2484254"/>
-            <a:ext cx="2884096" cy="1889492"/>
-          </a:xfrm>
-          <a:prstGeom prst="straightConnector1">
-            <a:avLst/>
-          </a:prstGeom>
-          <a:ln>
-            <a:solidFill>
-              <a:srgbClr val="7030A0"/>
-            </a:solidFill>
-            <a:headEnd type="none" w="lg" len="lg"/>
-            <a:tailEnd type="triangle" w="lg" len="lg"/>
-          </a:ln>
-        </p:spPr>
-        <p:style>
-          <a:lnRef idx="2">
-            <a:schemeClr val="accent1"/>
-          </a:lnRef>
-          <a:fillRef idx="0">
-            <a:schemeClr val="accent1"/>
-          </a:fillRef>
-          <a:effectRef idx="1">
-            <a:schemeClr val="accent1"/>
-          </a:effectRef>
-          <a:fontRef idx="minor">
-            <a:schemeClr val="tx1"/>
-          </a:fontRef>
-        </p:style>
-      </p:cxnSp>
-      <p:sp>
-        <p:nvSpPr>
-          <p:cNvPr id="17" name="Rounded Rectangle 16">
-            <a:extLst>
-              <a:ext uri="{FF2B5EF4-FFF2-40B4-BE49-F238E27FC236}">
-                <a16:creationId xmlns:a16="http://schemas.microsoft.com/office/drawing/2014/main" id="{B9CDBA23-CDA5-A740-AA0B-0B46BEA2DA30}"/>
-              </a:ext>
-            </a:extLst>
-          </p:cNvPr>
-          <p:cNvSpPr/>
-          <p:nvPr/>
-        </p:nvSpPr>
-        <p:spPr>
-          <a:xfrm>
-            <a:off x="123290" y="4373746"/>
-            <a:ext cx="2641385" cy="2140252"/>
-          </a:xfrm>
-          <a:prstGeom prst="roundRect">
-            <a:avLst/>
-          </a:prstGeom>
-          <a:solidFill>
-            <a:schemeClr val="accent1">
-              <a:lumMod val="20000"/>
-              <a:lumOff val="80000"/>
-            </a:schemeClr>
-          </a:solidFill>
-          <a:ln>
-            <a:solidFill>
-              <a:srgbClr val="7030A0"/>
-            </a:solidFill>
-          </a:ln>
-        </p:spPr>
-        <p:style>
-          <a:lnRef idx="1">
-            <a:schemeClr val="accent1"/>
-          </a:lnRef>
-          <a:fillRef idx="3">
-            <a:schemeClr val="accent1"/>
-          </a:fillRef>
-          <a:effectRef idx="2">
-            <a:schemeClr val="accent1"/>
-          </a:effectRef>
-          <a:fontRef idx="minor">
-            <a:schemeClr val="lt1"/>
-          </a:fontRef>
-        </p:style>
-        <p:txBody>
-          <a:bodyPr rtlCol="0" anchor="ctr"/>
-          <a:lstStyle/>
-          <a:p>
-            <a:pPr algn="ctr"/>
-            <a:r>
-              <a:rPr lang="en-US" sz="1600" u="sng" dirty="0" err="1">
-                <a:solidFill>
-                  <a:sysClr val="windowText" lastClr="000000"/>
-                </a:solidFill>
-              </a:rPr>
-              <a:t>InsurancePlan</a:t>
-            </a:r>
-            <a:endParaRPr lang="en-US" sz="1600" u="sng" dirty="0">
-              <a:solidFill>
-                <a:sysClr val="windowText" lastClr="000000"/>
-              </a:solidFill>
-            </a:endParaRPr>
-          </a:p>
-          <a:p>
-            <a:r>
-              <a:rPr lang="en-US" sz="1600" dirty="0">
-                <a:solidFill>
-                  <a:srgbClr val="002060"/>
-                </a:solidFill>
-              </a:rPr>
-              <a:t>Name: CIGNA QHP</a:t>
+              <a:t>Name: Acme QHP</a:t>
             </a:r>
           </a:p>
           <a:p>
@@ -11968,7 +10934,7 @@
     </p:spTree>
     <p:extLst>
       <p:ext uri="{BB962C8B-B14F-4D97-AF65-F5344CB8AC3E}">
-        <p14:creationId xmlns:p14="http://schemas.microsoft.com/office/powerpoint/2010/main" val="3150242065"/>
+        <p14:creationId xmlns:p14="http://schemas.microsoft.com/office/powerpoint/2010/main" val="2206279919"/>
       </p:ext>
     </p:extLst>
   </p:cSld>
@@ -21275,9 +20241,32 @@
               </a:rPr>
               <a:t>Acme of Connecticut Preferred Provider</a:t>
             </a:r>
+            <a:br>
+              <a:rPr lang="en-US" sz="1400" dirty="0">
+                <a:solidFill>
+                  <a:schemeClr val="tx1"/>
+                </a:solidFill>
+              </a:rPr>
+            </a:br>
+            <a:r>
+              <a:rPr lang="en-US" sz="1400" dirty="0" err="1">
+                <a:solidFill>
+                  <a:srgbClr val="FF0000"/>
+                </a:solidFill>
+              </a:rPr>
+              <a:t>type:payer</a:t>
+            </a:r>
+            <a:r>
+              <a:rPr lang="en-US" sz="1400" dirty="0">
+                <a:solidFill>
+                  <a:srgbClr val="FF0000"/>
+                </a:solidFill>
+              </a:rPr>
+              <a:t> (fixed)</a:t>
+            </a:r>
             <a:endParaRPr lang="en-US" dirty="0">
               <a:solidFill>
-                <a:schemeClr val="tx1"/>
+                <a:srgbClr val="FF0000"/>
               </a:solidFill>
             </a:endParaRPr>
           </a:p>
@@ -21506,13 +20495,34 @@
               </a:rPr>
             </a:br>
             <a:r>
-              <a:rPr lang="en-US" sz="1600" dirty="0">
-                <a:solidFill>
-                  <a:sysClr val="windowText" lastClr="000000"/>
-                </a:solidFill>
-              </a:rPr>
-              <a:t>CVS</a:t>
-            </a:r>
+              <a:rPr lang="en-US" sz="1600" dirty="0" err="1">
+                <a:solidFill>
+                  <a:sysClr val="windowText" lastClr="000000"/>
+                </a:solidFill>
+              </a:rPr>
+              <a:t>PharmOrgA</a:t>
+            </a:r>
+            <a:endParaRPr lang="en-US" sz="1600" dirty="0">
+              <a:solidFill>
+                <a:sysClr val="windowText" lastClr="000000"/>
+              </a:solidFill>
+            </a:endParaRPr>
+          </a:p>
+          <a:p>
+            <a:pPr algn="ctr"/>
+            <a:r>
+              <a:rPr lang="en-US" sz="1600" dirty="0" err="1">
+                <a:solidFill>
+                  <a:srgbClr val="FF0000"/>
+                </a:solidFill>
+              </a:rPr>
+              <a:t>Type:Provider</a:t>
+            </a:r>
+            <a:endParaRPr lang="en-US" sz="1600" dirty="0">
+              <a:solidFill>
+                <a:srgbClr val="FF0000"/>
+              </a:solidFill>
+            </a:endParaRPr>
           </a:p>
         </p:txBody>
       </p:sp>
@@ -22938,13 +21948,34 @@
               </a:rPr>
             </a:br>
             <a:r>
-              <a:rPr lang="en-US" sz="1600" dirty="0">
-                <a:solidFill>
-                  <a:sysClr val="windowText" lastClr="000000"/>
-                </a:solidFill>
-              </a:rPr>
-              <a:t>Target</a:t>
-            </a:r>
+              <a:rPr lang="en-US" sz="1600" dirty="0" err="1">
+                <a:solidFill>
+                  <a:sysClr val="windowText" lastClr="000000"/>
+                </a:solidFill>
+              </a:rPr>
+              <a:t>OrgB</a:t>
+            </a:r>
+            <a:endParaRPr lang="en-US" sz="1600" dirty="0">
+              <a:solidFill>
+                <a:sysClr val="windowText" lastClr="000000"/>
+              </a:solidFill>
+            </a:endParaRPr>
+          </a:p>
+          <a:p>
+            <a:pPr algn="ctr"/>
+            <a:r>
+              <a:rPr lang="en-US" sz="1600" dirty="0" err="1">
+                <a:solidFill>
+                  <a:srgbClr val="FF0000"/>
+                </a:solidFill>
+              </a:rPr>
+              <a:t>Type:bus</a:t>
+            </a:r>
+            <a:endParaRPr lang="en-US" sz="1600" dirty="0">
+              <a:solidFill>
+                <a:srgbClr val="FF0000"/>
+              </a:solidFill>
+            </a:endParaRPr>
           </a:p>
         </p:txBody>
       </p:sp>
@@ -24067,7 +23098,7 @@
           <a:p>
             <a:r>
               <a:rPr lang="en-US" dirty="0"/>
-              <a:t>Example:  Specialty Pharmacy 	</a:t>
+              <a:t>Example:  Compounding Pharmacy 	</a:t>
             </a:r>
           </a:p>
         </p:txBody>

</xml_diff>

<commit_message>
tweaks to the patterns.pptx
</commit_message>
<xml_diff>
--- a/fsh/ig-data/input/images/patterns.pptx
+++ b/fsh/ig-data/input/images/patterns.pptx
@@ -4668,19 +4668,19 @@
               </a:rPr>
             </a:br>
             <a:br>
-              <a:rPr lang="en-US" sz="1400" u="sng" dirty="0">
+              <a:rPr lang="en-US" sz="1400" u="sng">
                 <a:solidFill>
                   <a:srgbClr val="7030A0"/>
                 </a:solidFill>
               </a:rPr>
             </a:br>
             <a:r>
-              <a:rPr lang="en-US" sz="1400" dirty="0">
+              <a:rPr lang="en-US" sz="1400">
                 <a:solidFill>
                   <a:srgbClr val="7030A0"/>
                 </a:solidFill>
               </a:rPr>
-              <a:t>HospLoc2</a:t>
+              <a:t>HospLoc1</a:t>
             </a:r>
             <a:br>
               <a:rPr lang="en-US" sz="1200" dirty="0">
@@ -26658,7 +26658,7 @@
         <p:spPr>
           <a:xfrm>
             <a:off x="3968226" y="2965739"/>
-            <a:ext cx="2023463" cy="1422322"/>
+            <a:ext cx="2269940" cy="1422322"/>
           </a:xfrm>
           <a:prstGeom prst="roundRect">
             <a:avLst/>
@@ -26688,7 +26688,6 @@
           <a:bodyPr rtlCol="0" anchor="ctr"/>
           <a:lstStyle/>
           <a:p>
-            <a:pPr algn="ctr"/>
             <a:r>
               <a:rPr lang="en-US" sz="1600" u="sng" dirty="0">
                 <a:solidFill>
@@ -26714,11 +26713,10 @@
             </a:r>
           </a:p>
           <a:p>
-            <a:pPr algn="ctr"/>
             <a:r>
               <a:rPr lang="en-US" sz="1600" dirty="0">
                 <a:solidFill>
-                  <a:srgbClr val="FF0000"/>
+                  <a:schemeClr val="tx1"/>
                 </a:solidFill>
               </a:rPr>
               <a:t>Specialty: Mail Order</a:t>
@@ -27067,7 +27065,7 @@
         <p:spPr>
           <a:xfrm flipH="1" flipV="1">
             <a:off x="4975163" y="2467973"/>
-            <a:ext cx="4795" cy="497766"/>
+            <a:ext cx="128033" cy="497766"/>
           </a:xfrm>
           <a:prstGeom prst="straightConnector1">
             <a:avLst/>

</xml_diff>

<commit_message>
filled out representing.md and minor changes to patterns.pptx
</commit_message>
<xml_diff>
--- a/fsh/ig-data/input/images/patterns.pptx
+++ b/fsh/ig-data/input/images/patterns.pptx
@@ -4668,14 +4668,14 @@
               </a:rPr>
             </a:br>
             <a:br>
-              <a:rPr lang="en-US" sz="1400" u="sng">
+              <a:rPr lang="en-US" sz="1400" u="sng" dirty="0">
                 <a:solidFill>
                   <a:srgbClr val="7030A0"/>
                 </a:solidFill>
               </a:rPr>
             </a:br>
             <a:r>
-              <a:rPr lang="en-US" sz="1400">
+              <a:rPr lang="en-US" sz="1400" dirty="0">
                 <a:solidFill>
                   <a:srgbClr val="7030A0"/>
                 </a:solidFill>
@@ -11166,12 +11166,8 @@
               <a:rPr lang="en-US" dirty="0"/>
             </a:br>
             <a:r>
-              <a:rPr lang="en-US" dirty="0" err="1"/>
-              <a:t>Blueshield</a:t>
-            </a:r>
-            <a:r>
               <a:rPr lang="en-US" dirty="0"/>
-              <a:t> of CT Medicare Advantage</a:t>
+              <a:t>Acme of CT Medicare Advantage</a:t>
             </a:r>
           </a:p>
         </p:txBody>
@@ -11248,7 +11244,7 @@
             <a:r>
               <a:rPr lang="en-US" sz="1600" dirty="0">
                 <a:solidFill>
-                  <a:srgbClr val="FF0000"/>
+                  <a:schemeClr val="tx1"/>
                 </a:solidFill>
               </a:rPr>
               <a:t>Acme of CT</a:t>
@@ -11497,7 +11493,7 @@
                   <a:srgbClr val="002060"/>
                 </a:solidFill>
               </a:rPr>
-              <a:t>Name: BlueShield Medicare Advantage</a:t>
+              <a:t>Name: Acme Medicare Advantage</a:t>
             </a:r>
           </a:p>
           <a:p>
@@ -11927,7 +11923,7 @@
                   <a:sysClr val="windowText" lastClr="000000"/>
                 </a:solidFill>
               </a:rPr>
-              <a:t>name:BlueShield</a:t>
+              <a:t>name:Acme</a:t>
             </a:r>
             <a:r>
               <a:rPr lang="en-US" sz="1200" dirty="0">
@@ -12090,7 +12086,7 @@
         <p:spPr>
           <a:xfrm>
             <a:off x="4953505" y="5910294"/>
-            <a:ext cx="1901467" cy="646331"/>
+            <a:ext cx="1901467" cy="369332"/>
           </a:xfrm>
           <a:prstGeom prst="rect">
             <a:avLst/>
@@ -12103,14 +12099,11 @@
           </a:bodyPr>
           <a:lstStyle/>
           <a:p>
-            <a:r>
-              <a:rPr lang="en-US" dirty="0">
-                <a:solidFill>
-                  <a:srgbClr val="FF0000"/>
-                </a:solidFill>
-              </a:rPr>
-              <a:t>Separate Endpoint Example?</a:t>
-            </a:r>
+            <a:endParaRPr lang="en-US" dirty="0">
+              <a:solidFill>
+                <a:srgbClr val="FF0000"/>
+              </a:solidFill>
+            </a:endParaRPr>
           </a:p>
         </p:txBody>
       </p:sp>

</xml_diff>

<commit_message>
tweaked patterns and changed SHOULD to SHALL for includes in capability statement
</commit_message>
<xml_diff>
--- a/fsh/ig-data/input/images/patterns.pptx
+++ b/fsh/ig-data/input/images/patterns.pptx
@@ -273,7 +273,7 @@
           <a:p>
             <a:fld id="{762B5F1F-9383-3B41-847D-813E0CDEEF5D}" type="datetimeFigureOut">
               <a:rPr lang="en-US" smtClean="0"/>
-              <a:t>8/14/20</a:t>
+              <a:t>8/18/20</a:t>
             </a:fld>
             <a:endParaRPr lang="en-US"/>
           </a:p>
@@ -471,7 +471,7 @@
           <a:p>
             <a:fld id="{762B5F1F-9383-3B41-847D-813E0CDEEF5D}" type="datetimeFigureOut">
               <a:rPr lang="en-US" smtClean="0"/>
-              <a:t>8/14/20</a:t>
+              <a:t>8/18/20</a:t>
             </a:fld>
             <a:endParaRPr lang="en-US"/>
           </a:p>
@@ -679,7 +679,7 @@
           <a:p>
             <a:fld id="{762B5F1F-9383-3B41-847D-813E0CDEEF5D}" type="datetimeFigureOut">
               <a:rPr lang="en-US" smtClean="0"/>
-              <a:t>8/14/20</a:t>
+              <a:t>8/18/20</a:t>
             </a:fld>
             <a:endParaRPr lang="en-US"/>
           </a:p>
@@ -877,7 +877,7 @@
           <a:p>
             <a:fld id="{762B5F1F-9383-3B41-847D-813E0CDEEF5D}" type="datetimeFigureOut">
               <a:rPr lang="en-US" smtClean="0"/>
-              <a:t>8/14/20</a:t>
+              <a:t>8/18/20</a:t>
             </a:fld>
             <a:endParaRPr lang="en-US"/>
           </a:p>
@@ -1152,7 +1152,7 @@
           <a:p>
             <a:fld id="{762B5F1F-9383-3B41-847D-813E0CDEEF5D}" type="datetimeFigureOut">
               <a:rPr lang="en-US" smtClean="0"/>
-              <a:t>8/14/20</a:t>
+              <a:t>8/18/20</a:t>
             </a:fld>
             <a:endParaRPr lang="en-US"/>
           </a:p>
@@ -1417,7 +1417,7 @@
           <a:p>
             <a:fld id="{762B5F1F-9383-3B41-847D-813E0CDEEF5D}" type="datetimeFigureOut">
               <a:rPr lang="en-US" smtClean="0"/>
-              <a:t>8/14/20</a:t>
+              <a:t>8/18/20</a:t>
             </a:fld>
             <a:endParaRPr lang="en-US"/>
           </a:p>
@@ -1829,7 +1829,7 @@
           <a:p>
             <a:fld id="{762B5F1F-9383-3B41-847D-813E0CDEEF5D}" type="datetimeFigureOut">
               <a:rPr lang="en-US" smtClean="0"/>
-              <a:t>8/14/20</a:t>
+              <a:t>8/18/20</a:t>
             </a:fld>
             <a:endParaRPr lang="en-US"/>
           </a:p>
@@ -1970,7 +1970,7 @@
           <a:p>
             <a:fld id="{762B5F1F-9383-3B41-847D-813E0CDEEF5D}" type="datetimeFigureOut">
               <a:rPr lang="en-US" smtClean="0"/>
-              <a:t>8/14/20</a:t>
+              <a:t>8/18/20</a:t>
             </a:fld>
             <a:endParaRPr lang="en-US"/>
           </a:p>
@@ -2083,7 +2083,7 @@
           <a:p>
             <a:fld id="{762B5F1F-9383-3B41-847D-813E0CDEEF5D}" type="datetimeFigureOut">
               <a:rPr lang="en-US" smtClean="0"/>
-              <a:t>8/14/20</a:t>
+              <a:t>8/18/20</a:t>
             </a:fld>
             <a:endParaRPr lang="en-US"/>
           </a:p>
@@ -2394,7 +2394,7 @@
           <a:p>
             <a:fld id="{762B5F1F-9383-3B41-847D-813E0CDEEF5D}" type="datetimeFigureOut">
               <a:rPr lang="en-US" smtClean="0"/>
-              <a:t>8/14/20</a:t>
+              <a:t>8/18/20</a:t>
             </a:fld>
             <a:endParaRPr lang="en-US"/>
           </a:p>
@@ -2682,7 +2682,7 @@
           <a:p>
             <a:fld id="{762B5F1F-9383-3B41-847D-813E0CDEEF5D}" type="datetimeFigureOut">
               <a:rPr lang="en-US" smtClean="0"/>
-              <a:t>8/14/20</a:t>
+              <a:t>8/18/20</a:t>
             </a:fld>
             <a:endParaRPr lang="en-US"/>
           </a:p>
@@ -2923,7 +2923,7 @@
           <a:p>
             <a:fld id="{762B5F1F-9383-3B41-847D-813E0CDEEF5D}" type="datetimeFigureOut">
               <a:rPr lang="en-US" smtClean="0"/>
-              <a:t>8/14/20</a:t>
+              <a:t>8/18/20</a:t>
             </a:fld>
             <a:endParaRPr lang="en-US"/>
           </a:p>
@@ -3391,7 +3391,7 @@
           <a:p>
             <a:r>
               <a:rPr lang="en-US" dirty="0"/>
-              <a:t>August 14, 2020</a:t>
+              <a:t>August 18, 2020</a:t>
             </a:r>
           </a:p>
         </p:txBody>
@@ -7147,14 +7147,14 @@
           </p:cNvPr>
           <p:cNvCxnSpPr>
             <a:cxnSpLocks/>
-            <a:stCxn id="52" idx="3"/>
+            <a:stCxn id="7" idx="0"/>
           </p:cNvCxnSpPr>
           <p:nvPr/>
         </p:nvCxnSpPr>
         <p:spPr>
           <a:xfrm flipV="1">
-            <a:off x="5381120" y="451154"/>
-            <a:ext cx="3110356" cy="1812592"/>
+            <a:off x="4994627" y="451154"/>
+            <a:ext cx="3496849" cy="2722968"/>
           </a:xfrm>
           <a:prstGeom prst="straightConnector1">
             <a:avLst/>
@@ -7880,7 +7880,7 @@
         </p:nvSpPr>
         <p:spPr>
           <a:xfrm>
-            <a:off x="5879138" y="2331076"/>
+            <a:off x="5201964" y="1428469"/>
             <a:ext cx="954749" cy="276999"/>
           </a:xfrm>
           <a:prstGeom prst="rect">
@@ -8092,7 +8092,7 @@
         </p:nvSpPr>
         <p:spPr>
           <a:xfrm>
-            <a:off x="6751884" y="1289970"/>
+            <a:off x="5201964" y="2720776"/>
             <a:ext cx="1287212" cy="276999"/>
           </a:xfrm>
           <a:prstGeom prst="rect">
@@ -12073,42 +12073,6 @@
       </p:sp>
       <p:sp>
         <p:nvSpPr>
-          <p:cNvPr id="3" name="TextBox 2">
-            <a:extLst>
-              <a:ext uri="{FF2B5EF4-FFF2-40B4-BE49-F238E27FC236}">
-                <a16:creationId xmlns:a16="http://schemas.microsoft.com/office/drawing/2014/main" id="{F4071EA7-1C73-1D41-87AA-0DD3C494042D}"/>
-              </a:ext>
-            </a:extLst>
-          </p:cNvPr>
-          <p:cNvSpPr txBox="1"/>
-          <p:nvPr/>
-        </p:nvSpPr>
-        <p:spPr>
-          <a:xfrm>
-            <a:off x="4953505" y="5910294"/>
-            <a:ext cx="1901467" cy="369332"/>
-          </a:xfrm>
-          <a:prstGeom prst="rect">
-            <a:avLst/>
-          </a:prstGeom>
-          <a:noFill/>
-        </p:spPr>
-        <p:txBody>
-          <a:bodyPr wrap="square" rtlCol="0">
-            <a:spAutoFit/>
-          </a:bodyPr>
-          <a:lstStyle/>
-          <a:p>
-            <a:endParaRPr lang="en-US" dirty="0">
-              <a:solidFill>
-                <a:srgbClr val="FF0000"/>
-              </a:solidFill>
-            </a:endParaRPr>
-          </a:p>
-        </p:txBody>
-      </p:sp>
-      <p:sp>
-        <p:nvSpPr>
           <p:cNvPr id="14" name="TextBox 13">
             <a:extLst>
               <a:ext uri="{FF2B5EF4-FFF2-40B4-BE49-F238E27FC236}">
@@ -15326,7 +15290,7 @@
         </p:nvCxnSpPr>
         <p:spPr>
           <a:xfrm flipV="1">
-            <a:off x="7264370" y="4105523"/>
+            <a:off x="7256571" y="4105523"/>
             <a:ext cx="0" cy="671974"/>
           </a:xfrm>
           <a:prstGeom prst="straightConnector1">
@@ -15865,126 +15829,6 @@
       </p:sp>
       <p:sp>
         <p:nvSpPr>
-          <p:cNvPr id="31" name="Rounded Rectangle 11">
-            <a:extLst>
-              <a:ext uri="{FF2B5EF4-FFF2-40B4-BE49-F238E27FC236}">
-                <a16:creationId xmlns:a16="http://schemas.microsoft.com/office/drawing/2014/main" id="{FDC049FC-3033-E24F-8C0B-499913E7B54D}"/>
-              </a:ext>
-            </a:extLst>
-          </p:cNvPr>
-          <p:cNvSpPr/>
-          <p:nvPr/>
-        </p:nvSpPr>
-        <p:spPr>
-          <a:xfrm>
-            <a:off x="7893649" y="3421291"/>
-            <a:ext cx="1336490" cy="731109"/>
-          </a:xfrm>
-          <a:prstGeom prst="roundRect">
-            <a:avLst/>
-          </a:prstGeom>
-          <a:solidFill>
-            <a:schemeClr val="accent1">
-              <a:lumMod val="20000"/>
-              <a:lumOff val="80000"/>
-            </a:schemeClr>
-          </a:solidFill>
-          <a:ln>
-            <a:solidFill>
-              <a:schemeClr val="tx1"/>
-            </a:solidFill>
-          </a:ln>
-        </p:spPr>
-        <p:style>
-          <a:lnRef idx="1">
-            <a:schemeClr val="accent1"/>
-          </a:lnRef>
-          <a:fillRef idx="3">
-            <a:schemeClr val="accent1"/>
-          </a:fillRef>
-          <a:effectRef idx="2">
-            <a:schemeClr val="accent1"/>
-          </a:effectRef>
-          <a:fontRef idx="minor">
-            <a:schemeClr val="lt1"/>
-          </a:fontRef>
-        </p:style>
-        <p:txBody>
-          <a:bodyPr rtlCol="0" anchor="t"/>
-          <a:lstStyle/>
-          <a:p>
-            <a:pPr marL="0" marR="0" lvl="0" indent="0" algn="ctr" defTabSz="914400" rtl="0" eaLnBrk="1" fontAlgn="auto" latinLnBrk="0" hangingPunct="1">
-              <a:lnSpc>
-                <a:spcPct val="100000"/>
-              </a:lnSpc>
-              <a:spcBef>
-                <a:spcPts val="0"/>
-              </a:spcBef>
-              <a:spcAft>
-                <a:spcPts val="0"/>
-              </a:spcAft>
-              <a:buClrTx/>
-              <a:buSzTx/>
-              <a:buFontTx/>
-              <a:buNone/>
-              <a:tabLst/>
-              <a:defRPr/>
-            </a:pPr>
-            <a:r>
-              <a:rPr kumimoji="0" lang="en-US" sz="1200" b="0" i="0" u="sng" strike="noStrike" kern="1200" cap="none" spc="0" normalizeH="0" baseline="0" noProof="0" dirty="0">
-                <a:ln>
-                  <a:noFill/>
-                </a:ln>
-                <a:solidFill>
-                  <a:srgbClr val="002060"/>
-                </a:solidFill>
-                <a:effectLst/>
-                <a:uLnTx/>
-                <a:uFillTx/>
-                <a:latin typeface="Calibri" panose="020F0502020204030204"/>
-                <a:ea typeface="+mn-ea"/>
-                <a:cs typeface="+mn-cs"/>
-              </a:rPr>
-              <a:t>Location</a:t>
-            </a:r>
-            <a:br>
-              <a:rPr kumimoji="0" lang="en-US" sz="1200" b="0" i="0" u="sng" strike="noStrike" kern="1200" cap="none" spc="0" normalizeH="0" baseline="0" noProof="0" dirty="0">
-                <a:ln>
-                  <a:noFill/>
-                </a:ln>
-                <a:solidFill>
-                  <a:srgbClr val="002060"/>
-                </a:solidFill>
-                <a:effectLst/>
-                <a:uLnTx/>
-                <a:uFillTx/>
-                <a:latin typeface="Calibri" panose="020F0502020204030204"/>
-                <a:ea typeface="+mn-ea"/>
-                <a:cs typeface="+mn-cs"/>
-              </a:rPr>
-            </a:br>
-            <a:r>
-              <a:rPr kumimoji="0" lang="en-US" sz="1200" b="0" i="0" u="none" strike="noStrike" kern="1200" cap="none" spc="0" normalizeH="0" baseline="0" noProof="0" dirty="0">
-                <a:ln>
-                  <a:noFill/>
-                </a:ln>
-                <a:solidFill>
-                  <a:srgbClr val="002060"/>
-                </a:solidFill>
-                <a:effectLst/>
-                <a:uLnTx/>
-                <a:uFillTx/>
-                <a:latin typeface="Calibri" panose="020F0502020204030204"/>
-                <a:ea typeface="+mn-ea"/>
-                <a:cs typeface="+mn-cs"/>
-              </a:rPr>
-              <a:t>type: Hospital</a:t>
-            </a:r>
-          </a:p>
-        </p:txBody>
-      </p:sp>
-      <p:sp>
-        <p:nvSpPr>
           <p:cNvPr id="2" name="TextBox 1">
             <a:extLst>
               <a:ext uri="{FF2B5EF4-FFF2-40B4-BE49-F238E27FC236}">
@@ -16117,50 +15961,6 @@
                 </a:solidFill>
               </a:rPr>
               <a:t>HospLoc1</a:t>
-            </a:r>
-          </a:p>
-          <a:p>
-            <a:pPr algn="ctr"/>
-            <a:endParaRPr lang="en-US" sz="1000" dirty="0"/>
-          </a:p>
-        </p:txBody>
-      </p:sp>
-      <p:sp>
-        <p:nvSpPr>
-          <p:cNvPr id="44" name="TextBox 43">
-            <a:extLst>
-              <a:ext uri="{FF2B5EF4-FFF2-40B4-BE49-F238E27FC236}">
-                <a16:creationId xmlns:a16="http://schemas.microsoft.com/office/drawing/2014/main" id="{1A7DDA9C-81CD-EA40-9C30-229E4F558CEE}"/>
-              </a:ext>
-            </a:extLst>
-          </p:cNvPr>
-          <p:cNvSpPr txBox="1"/>
-          <p:nvPr/>
-        </p:nvSpPr>
-        <p:spPr>
-          <a:xfrm>
-            <a:off x="7754688" y="3905468"/>
-            <a:ext cx="1672299" cy="400110"/>
-          </a:xfrm>
-          <a:prstGeom prst="rect">
-            <a:avLst/>
-          </a:prstGeom>
-          <a:noFill/>
-        </p:spPr>
-        <p:txBody>
-          <a:bodyPr wrap="square" rtlCol="0" anchor="ctr">
-            <a:spAutoFit/>
-          </a:bodyPr>
-          <a:lstStyle/>
-          <a:p>
-            <a:pPr algn="ctr"/>
-            <a:r>
-              <a:rPr lang="en-US" sz="1000" dirty="0">
-                <a:solidFill>
-                  <a:srgbClr val="7030A0"/>
-                </a:solidFill>
-              </a:rPr>
-              <a:t>HospLoc2</a:t>
             </a:r>
           </a:p>
           <a:p>
@@ -24110,13 +23910,14 @@
           <p:cNvCxnSpPr>
             <a:cxnSpLocks/>
             <a:stCxn id="31" idx="0"/>
+            <a:endCxn id="55" idx="2"/>
           </p:cNvCxnSpPr>
           <p:nvPr/>
         </p:nvCxnSpPr>
         <p:spPr>
           <a:xfrm flipV="1">
-            <a:off x="10003104" y="1826050"/>
-            <a:ext cx="150195" cy="1599764"/>
+            <a:off x="10003104" y="1767625"/>
+            <a:ext cx="339223" cy="1658189"/>
           </a:xfrm>
           <a:prstGeom prst="straightConnector1">
             <a:avLst/>
@@ -24158,8 +23959,8 @@
         </p:nvCxnSpPr>
         <p:spPr>
           <a:xfrm flipH="1" flipV="1">
-            <a:off x="10305047" y="1804213"/>
-            <a:ext cx="1151368" cy="1622514"/>
+            <a:off x="10366895" y="1822764"/>
+            <a:ext cx="1089520" cy="1603963"/>
           </a:xfrm>
           <a:prstGeom prst="straightConnector1">
             <a:avLst/>
@@ -24333,7 +24134,7 @@
         </p:nvSpPr>
         <p:spPr>
           <a:xfrm>
-            <a:off x="8719786" y="375585"/>
+            <a:off x="9492098" y="330005"/>
             <a:ext cx="1700458" cy="1437620"/>
           </a:xfrm>
           <a:prstGeom prst="roundRect">
@@ -24489,7 +24290,7 @@
         </p:nvSpPr>
         <p:spPr>
           <a:xfrm>
-            <a:off x="9231781" y="1361780"/>
+            <a:off x="9978810" y="1083592"/>
             <a:ext cx="676467" cy="307777"/>
           </a:xfrm>
           <a:prstGeom prst="rect">

</xml_diff>

<commit_message>
minor changes to endpoint usecase extension, and its example.  Updated capability statement in response to feedback
</commit_message>
<xml_diff>
--- a/fsh/ig-data/input/images/patterns.pptx
+++ b/fsh/ig-data/input/images/patterns.pptx
@@ -3390,8 +3390,12 @@
           <a:lstStyle/>
           <a:p>
             <a:r>
+              <a:rPr lang="en-US"/>
+              <a:t>August 19, </a:t>
+            </a:r>
+            <a:r>
               <a:rPr lang="en-US" dirty="0"/>
-              <a:t>August 18, 2020</a:t>
+              <a:t>2020</a:t>
             </a:r>
           </a:p>
         </p:txBody>
@@ -7147,14 +7151,13 @@
           </p:cNvPr>
           <p:cNvCxnSpPr>
             <a:cxnSpLocks/>
-            <a:stCxn id="7" idx="0"/>
           </p:cNvCxnSpPr>
           <p:nvPr/>
         </p:nvCxnSpPr>
         <p:spPr>
           <a:xfrm flipV="1">
-            <a:off x="4994627" y="451154"/>
-            <a:ext cx="3496849" cy="2722968"/>
+            <a:off x="7029085" y="451154"/>
+            <a:ext cx="1462391" cy="928844"/>
           </a:xfrm>
           <a:prstGeom prst="straightConnector1">
             <a:avLst/>
@@ -8092,7 +8095,7 @@
         </p:nvSpPr>
         <p:spPr>
           <a:xfrm>
-            <a:off x="5201964" y="2720776"/>
+            <a:off x="6519772" y="944814"/>
             <a:ext cx="1287212" cy="276999"/>
           </a:xfrm>
           <a:prstGeom prst="rect">
@@ -9083,6 +9086,47 @@
           </a:p>
         </p:txBody>
       </p:sp>
+      <p:cxnSp>
+        <p:nvCxnSpPr>
+          <p:cNvPr id="54" name="Straight Arrow Connector 53">
+            <a:extLst>
+              <a:ext uri="{FF2B5EF4-FFF2-40B4-BE49-F238E27FC236}">
+                <a16:creationId xmlns:a16="http://schemas.microsoft.com/office/drawing/2014/main" id="{8F5174B0-1F5E-7E47-A193-2DB2161C9B61}"/>
+              </a:ext>
+            </a:extLst>
+          </p:cNvPr>
+          <p:cNvCxnSpPr>
+            <a:cxnSpLocks/>
+          </p:cNvCxnSpPr>
+          <p:nvPr/>
+        </p:nvCxnSpPr>
+        <p:spPr>
+          <a:xfrm>
+            <a:off x="5638552" y="928127"/>
+            <a:ext cx="1400548" cy="470785"/>
+          </a:xfrm>
+          <a:prstGeom prst="straightConnector1">
+            <a:avLst/>
+          </a:prstGeom>
+          <a:ln>
+            <a:tailEnd type="triangle"/>
+          </a:ln>
+        </p:spPr>
+        <p:style>
+          <a:lnRef idx="1">
+            <a:schemeClr val="accent1"/>
+          </a:lnRef>
+          <a:fillRef idx="0">
+            <a:schemeClr val="accent1"/>
+          </a:fillRef>
+          <a:effectRef idx="0">
+            <a:schemeClr val="accent1"/>
+          </a:effectRef>
+          <a:fontRef idx="minor">
+            <a:schemeClr val="tx1"/>
+          </a:fontRef>
+        </p:style>
+      </p:cxnSp>
     </p:spTree>
     <p:extLst>
       <p:ext uri="{BB962C8B-B14F-4D97-AF65-F5344CB8AC3E}">

</xml_diff>

<commit_message>
updated CodeSystems and ValueSets as per Rob/Marc review, and brought examples into line with changes
</commit_message>
<xml_diff>
--- a/fsh/ig-data/input/images/patterns.pptx
+++ b/fsh/ig-data/input/images/patterns.pptx
@@ -3390,12 +3390,8 @@
           <a:lstStyle/>
           <a:p>
             <a:r>
-              <a:rPr lang="en-US"/>
-              <a:t>August 19, </a:t>
-            </a:r>
-            <a:r>
               <a:rPr lang="en-US" dirty="0"/>
-              <a:t>2020</a:t>
+              <a:t>August 19, 2020</a:t>
             </a:r>
           </a:p>
         </p:txBody>

</xml_diff>

<commit_message>
added Gail's virtual counselor example
</commit_message>
<xml_diff>
--- a/fsh/ig-data/input/images/patterns.pptx
+++ b/fsh/ig-data/input/images/patterns.pptx
@@ -273,7 +273,7 @@
           <a:p>
             <a:fld id="{762B5F1F-9383-3B41-847D-813E0CDEEF5D}" type="datetimeFigureOut">
               <a:rPr lang="en-US" smtClean="0"/>
-              <a:t>8/18/20</a:t>
+              <a:t>8/28/20</a:t>
             </a:fld>
             <a:endParaRPr lang="en-US"/>
           </a:p>
@@ -471,7 +471,7 @@
           <a:p>
             <a:fld id="{762B5F1F-9383-3B41-847D-813E0CDEEF5D}" type="datetimeFigureOut">
               <a:rPr lang="en-US" smtClean="0"/>
-              <a:t>8/18/20</a:t>
+              <a:t>8/28/20</a:t>
             </a:fld>
             <a:endParaRPr lang="en-US"/>
           </a:p>
@@ -679,7 +679,7 @@
           <a:p>
             <a:fld id="{762B5F1F-9383-3B41-847D-813E0CDEEF5D}" type="datetimeFigureOut">
               <a:rPr lang="en-US" smtClean="0"/>
-              <a:t>8/18/20</a:t>
+              <a:t>8/28/20</a:t>
             </a:fld>
             <a:endParaRPr lang="en-US"/>
           </a:p>
@@ -877,7 +877,7 @@
           <a:p>
             <a:fld id="{762B5F1F-9383-3B41-847D-813E0CDEEF5D}" type="datetimeFigureOut">
               <a:rPr lang="en-US" smtClean="0"/>
-              <a:t>8/18/20</a:t>
+              <a:t>8/28/20</a:t>
             </a:fld>
             <a:endParaRPr lang="en-US"/>
           </a:p>
@@ -1152,7 +1152,7 @@
           <a:p>
             <a:fld id="{762B5F1F-9383-3B41-847D-813E0CDEEF5D}" type="datetimeFigureOut">
               <a:rPr lang="en-US" smtClean="0"/>
-              <a:t>8/18/20</a:t>
+              <a:t>8/28/20</a:t>
             </a:fld>
             <a:endParaRPr lang="en-US"/>
           </a:p>
@@ -1417,7 +1417,7 @@
           <a:p>
             <a:fld id="{762B5F1F-9383-3B41-847D-813E0CDEEF5D}" type="datetimeFigureOut">
               <a:rPr lang="en-US" smtClean="0"/>
-              <a:t>8/18/20</a:t>
+              <a:t>8/28/20</a:t>
             </a:fld>
             <a:endParaRPr lang="en-US"/>
           </a:p>
@@ -1829,7 +1829,7 @@
           <a:p>
             <a:fld id="{762B5F1F-9383-3B41-847D-813E0CDEEF5D}" type="datetimeFigureOut">
               <a:rPr lang="en-US" smtClean="0"/>
-              <a:t>8/18/20</a:t>
+              <a:t>8/28/20</a:t>
             </a:fld>
             <a:endParaRPr lang="en-US"/>
           </a:p>
@@ -1970,7 +1970,7 @@
           <a:p>
             <a:fld id="{762B5F1F-9383-3B41-847D-813E0CDEEF5D}" type="datetimeFigureOut">
               <a:rPr lang="en-US" smtClean="0"/>
-              <a:t>8/18/20</a:t>
+              <a:t>8/28/20</a:t>
             </a:fld>
             <a:endParaRPr lang="en-US"/>
           </a:p>
@@ -2083,7 +2083,7 @@
           <a:p>
             <a:fld id="{762B5F1F-9383-3B41-847D-813E0CDEEF5D}" type="datetimeFigureOut">
               <a:rPr lang="en-US" smtClean="0"/>
-              <a:t>8/18/20</a:t>
+              <a:t>8/28/20</a:t>
             </a:fld>
             <a:endParaRPr lang="en-US"/>
           </a:p>
@@ -2394,7 +2394,7 @@
           <a:p>
             <a:fld id="{762B5F1F-9383-3B41-847D-813E0CDEEF5D}" type="datetimeFigureOut">
               <a:rPr lang="en-US" smtClean="0"/>
-              <a:t>8/18/20</a:t>
+              <a:t>8/28/20</a:t>
             </a:fld>
             <a:endParaRPr lang="en-US"/>
           </a:p>
@@ -2682,7 +2682,7 @@
           <a:p>
             <a:fld id="{762B5F1F-9383-3B41-847D-813E0CDEEF5D}" type="datetimeFigureOut">
               <a:rPr lang="en-US" smtClean="0"/>
-              <a:t>8/18/20</a:t>
+              <a:t>8/28/20</a:t>
             </a:fld>
             <a:endParaRPr lang="en-US"/>
           </a:p>
@@ -2923,7 +2923,7 @@
           <a:p>
             <a:fld id="{762B5F1F-9383-3B41-847D-813E0CDEEF5D}" type="datetimeFigureOut">
               <a:rPr lang="en-US" smtClean="0"/>
-              <a:t>8/18/20</a:t>
+              <a:t>8/28/20</a:t>
             </a:fld>
             <a:endParaRPr lang="en-US"/>
           </a:p>

</xml_diff>

<commit_message>
updated PPT and discussion
</commit_message>
<xml_diff>
--- a/fsh/ig-data/input/images/patterns.pptx
+++ b/fsh/ig-data/input/images/patterns.pptx
@@ -23113,7 +23113,7 @@
         <p:spPr>
           <a:xfrm flipH="1" flipV="1">
             <a:off x="1792870" y="2463037"/>
-            <a:ext cx="15662" cy="1067704"/>
+            <a:ext cx="34924" cy="1067704"/>
           </a:xfrm>
           <a:prstGeom prst="straightConnector1">
             <a:avLst/>
@@ -23419,8 +23419,8 @@
         </p:nvSpPr>
         <p:spPr>
           <a:xfrm>
-            <a:off x="655202" y="3530741"/>
-            <a:ext cx="2306659" cy="1437620"/>
+            <a:off x="521644" y="3530741"/>
+            <a:ext cx="2612300" cy="1437620"/>
           </a:xfrm>
           <a:prstGeom prst="roundRect">
             <a:avLst/>
@@ -23471,7 +23471,6 @@
             </a:endParaRPr>
           </a:p>
           <a:p>
-            <a:pPr algn="ctr"/>
             <a:r>
               <a:rPr lang="en-US" sz="1600" dirty="0">
                 <a:solidFill>
@@ -23487,6 +23486,21 @@
                 </a:solidFill>
               </a:rPr>
               <a:t>: Pharmacy</a:t>
+            </a:r>
+            <a:br>
+              <a:rPr lang="en-US" sz="1600" dirty="0">
+                <a:solidFill>
+                  <a:schemeClr val="tx1"/>
+                </a:solidFill>
+              </a:rPr>
+            </a:br>
+            <a:r>
+              <a:rPr lang="en-US" sz="1600" dirty="0">
+                <a:solidFill>
+                  <a:sysClr val="windowText" lastClr="000000"/>
+                </a:solidFill>
+              </a:rPr>
+              <a:t>Specialty: Retail Pharmacy</a:t>
             </a:r>
             <a:br>
               <a:rPr lang="en-US" sz="1600" dirty="0">
@@ -25710,7 +25724,7 @@
           <a:p>
             <a:pPr algn="ctr"/>
             <a:r>
-              <a:rPr lang="en-US" sz="1600" u="sng" dirty="0">
+              <a:rPr lang="en-US" sz="1600" dirty="0">
                 <a:solidFill>
                   <a:sysClr val="windowText" lastClr="000000"/>
                 </a:solidFill>
@@ -25718,12 +25732,31 @@
               <a:t>Code</a:t>
             </a:r>
             <a:r>
-              <a:rPr lang="en-US" sz="1600" u="sng" dirty="0">
+              <a:rPr lang="en-US" sz="1600" dirty="0">
                 <a:solidFill>
                   <a:schemeClr val="tx1"/>
                 </a:solidFill>
               </a:rPr>
               <a:t>: Pharmacy</a:t>
+            </a:r>
+          </a:p>
+          <a:p>
+            <a:pPr algn="ctr"/>
+            <a:r>
+              <a:rPr lang="en-US" sz="1600" dirty="0">
+                <a:solidFill>
+                  <a:schemeClr val="tx1"/>
+                </a:solidFill>
+              </a:rPr>
+              <a:t>Specialty:  </a:t>
+            </a:r>
+            <a:r>
+              <a:rPr lang="en-US" sz="1600" dirty="0" err="1">
+                <a:solidFill>
+                  <a:schemeClr val="tx1"/>
+                </a:solidFill>
+              </a:rPr>
+              <a:t>CompoundingPharmacy</a:t>
             </a:r>
             <a:br>
               <a:rPr lang="en-US" sz="1600" dirty="0">
@@ -26369,7 +26402,7 @@
         </p:nvSpPr>
         <p:spPr>
           <a:xfrm>
-            <a:off x="1061002" y="4414534"/>
+            <a:off x="1052195" y="4598445"/>
             <a:ext cx="1463734" cy="307777"/>
           </a:xfrm>
           <a:prstGeom prst="rect">
@@ -27141,6 +27174,22 @@
                 </a:solidFill>
               </a:rPr>
               <a:t>OrganizationAffiliation</a:t>
+            </a:r>
+            <a:endParaRPr lang="en-US" sz="1600" u="sng" dirty="0">
+              <a:solidFill>
+                <a:sysClr val="windowText" lastClr="000000"/>
+              </a:solidFill>
+            </a:endParaRPr>
+          </a:p>
+          <a:p>
+            <a:pPr algn="ctr"/>
+            <a:r>
+              <a:rPr lang="en-US" sz="1600">
+                <a:solidFill>
+                  <a:schemeClr val="tx1"/>
+                </a:solidFill>
+              </a:rPr>
+              <a:t>Specialty: Mail Order</a:t>
             </a:r>
             <a:br>
               <a:rPr lang="en-US" sz="1600" dirty="0">

</xml_diff>

<commit_message>
found error in patterns.pptx
</commit_message>
<xml_diff>
--- a/fsh/ig-data/input/images/patterns.pptx
+++ b/fsh/ig-data/input/images/patterns.pptx
@@ -273,7 +273,7 @@
           <a:p>
             <a:fld id="{762B5F1F-9383-3B41-847D-813E0CDEEF5D}" type="datetimeFigureOut">
               <a:rPr lang="en-US" smtClean="0"/>
-              <a:t>9/10/20</a:t>
+              <a:t>11/17/20</a:t>
             </a:fld>
             <a:endParaRPr lang="en-US"/>
           </a:p>
@@ -471,7 +471,7 @@
           <a:p>
             <a:fld id="{762B5F1F-9383-3B41-847D-813E0CDEEF5D}" type="datetimeFigureOut">
               <a:rPr lang="en-US" smtClean="0"/>
-              <a:t>9/10/20</a:t>
+              <a:t>11/17/20</a:t>
             </a:fld>
             <a:endParaRPr lang="en-US"/>
           </a:p>
@@ -679,7 +679,7 @@
           <a:p>
             <a:fld id="{762B5F1F-9383-3B41-847D-813E0CDEEF5D}" type="datetimeFigureOut">
               <a:rPr lang="en-US" smtClean="0"/>
-              <a:t>9/10/20</a:t>
+              <a:t>11/17/20</a:t>
             </a:fld>
             <a:endParaRPr lang="en-US"/>
           </a:p>
@@ -877,7 +877,7 @@
           <a:p>
             <a:fld id="{762B5F1F-9383-3B41-847D-813E0CDEEF5D}" type="datetimeFigureOut">
               <a:rPr lang="en-US" smtClean="0"/>
-              <a:t>9/10/20</a:t>
+              <a:t>11/17/20</a:t>
             </a:fld>
             <a:endParaRPr lang="en-US"/>
           </a:p>
@@ -1152,7 +1152,7 @@
           <a:p>
             <a:fld id="{762B5F1F-9383-3B41-847D-813E0CDEEF5D}" type="datetimeFigureOut">
               <a:rPr lang="en-US" smtClean="0"/>
-              <a:t>9/10/20</a:t>
+              <a:t>11/17/20</a:t>
             </a:fld>
             <a:endParaRPr lang="en-US"/>
           </a:p>
@@ -1417,7 +1417,7 @@
           <a:p>
             <a:fld id="{762B5F1F-9383-3B41-847D-813E0CDEEF5D}" type="datetimeFigureOut">
               <a:rPr lang="en-US" smtClean="0"/>
-              <a:t>9/10/20</a:t>
+              <a:t>11/17/20</a:t>
             </a:fld>
             <a:endParaRPr lang="en-US"/>
           </a:p>
@@ -1829,7 +1829,7 @@
           <a:p>
             <a:fld id="{762B5F1F-9383-3B41-847D-813E0CDEEF5D}" type="datetimeFigureOut">
               <a:rPr lang="en-US" smtClean="0"/>
-              <a:t>9/10/20</a:t>
+              <a:t>11/17/20</a:t>
             </a:fld>
             <a:endParaRPr lang="en-US"/>
           </a:p>
@@ -1970,7 +1970,7 @@
           <a:p>
             <a:fld id="{762B5F1F-9383-3B41-847D-813E0CDEEF5D}" type="datetimeFigureOut">
               <a:rPr lang="en-US" smtClean="0"/>
-              <a:t>9/10/20</a:t>
+              <a:t>11/17/20</a:t>
             </a:fld>
             <a:endParaRPr lang="en-US"/>
           </a:p>
@@ -2083,7 +2083,7 @@
           <a:p>
             <a:fld id="{762B5F1F-9383-3B41-847D-813E0CDEEF5D}" type="datetimeFigureOut">
               <a:rPr lang="en-US" smtClean="0"/>
-              <a:t>9/10/20</a:t>
+              <a:t>11/17/20</a:t>
             </a:fld>
             <a:endParaRPr lang="en-US"/>
           </a:p>
@@ -2394,7 +2394,7 @@
           <a:p>
             <a:fld id="{762B5F1F-9383-3B41-847D-813E0CDEEF5D}" type="datetimeFigureOut">
               <a:rPr lang="en-US" smtClean="0"/>
-              <a:t>9/10/20</a:t>
+              <a:t>11/17/20</a:t>
             </a:fld>
             <a:endParaRPr lang="en-US"/>
           </a:p>
@@ -2682,7 +2682,7 @@
           <a:p>
             <a:fld id="{762B5F1F-9383-3B41-847D-813E0CDEEF5D}" type="datetimeFigureOut">
               <a:rPr lang="en-US" smtClean="0"/>
-              <a:t>9/10/20</a:t>
+              <a:t>11/17/20</a:t>
             </a:fld>
             <a:endParaRPr lang="en-US"/>
           </a:p>
@@ -2923,7 +2923,7 @@
           <a:p>
             <a:fld id="{762B5F1F-9383-3B41-847D-813E0CDEEF5D}" type="datetimeFigureOut">
               <a:rPr lang="en-US" smtClean="0"/>
-              <a:t>9/10/20</a:t>
+              <a:t>11/17/20</a:t>
             </a:fld>
             <a:endParaRPr lang="en-US"/>
           </a:p>
@@ -18273,71 +18273,6 @@
       </p:cxnSp>
       <p:sp>
         <p:nvSpPr>
-          <p:cNvPr id="42" name="TextBox 41">
-            <a:extLst>
-              <a:ext uri="{FF2B5EF4-FFF2-40B4-BE49-F238E27FC236}">
-                <a16:creationId xmlns:a16="http://schemas.microsoft.com/office/drawing/2014/main" id="{6A5ACDAA-A65B-6643-9618-14802C268E58}"/>
-              </a:ext>
-            </a:extLst>
-          </p:cNvPr>
-          <p:cNvSpPr txBox="1"/>
-          <p:nvPr/>
-        </p:nvSpPr>
-        <p:spPr>
-          <a:xfrm>
-            <a:off x="4574689" y="4963143"/>
-            <a:ext cx="1343060" cy="369332"/>
-          </a:xfrm>
-          <a:prstGeom prst="rect">
-            <a:avLst/>
-          </a:prstGeom>
-          <a:noFill/>
-        </p:spPr>
-        <p:txBody>
-          <a:bodyPr wrap="none" rtlCol="0">
-            <a:spAutoFit/>
-          </a:bodyPr>
-          <a:lstStyle/>
-          <a:p>
-            <a:pPr marL="0" marR="0" lvl="0" indent="0" algn="l" defTabSz="914400" rtl="0" eaLnBrk="1" fontAlgn="auto" latinLnBrk="0" hangingPunct="1">
-              <a:lnSpc>
-                <a:spcPct val="100000"/>
-              </a:lnSpc>
-              <a:spcBef>
-                <a:spcPts val="0"/>
-              </a:spcBef>
-              <a:spcAft>
-                <a:spcPts val="0"/>
-              </a:spcAft>
-              <a:buClrTx/>
-              <a:buSzTx/>
-              <a:buFontTx/>
-              <a:buNone/>
-              <a:tabLst/>
-              <a:defRPr/>
-            </a:pPr>
-            <a:r>
-              <a:rPr kumimoji="0" lang="en-US" sz="1800" b="0" i="0" u="none" strike="noStrike" kern="1200" cap="none" spc="0" normalizeH="0" baseline="0" noProof="0" dirty="0">
-                <a:ln>
-                  <a:noFill/>
-                </a:ln>
-                <a:solidFill>
-                  <a:prstClr val="black"/>
-                </a:solidFill>
-                <a:effectLst/>
-                <a:uLnTx/>
-                <a:uFillTx/>
-                <a:latin typeface="Calibri" panose="020F0502020204030204"/>
-                <a:ea typeface="+mn-ea"/>
-                <a:cs typeface="+mn-cs"/>
-              </a:rPr>
-              <a:t>organization</a:t>
-            </a:r>
-          </a:p>
-        </p:txBody>
-      </p:sp>
-      <p:sp>
-        <p:nvSpPr>
           <p:cNvPr id="43" name="TextBox 42">
             <a:extLst>
               <a:ext uri="{FF2B5EF4-FFF2-40B4-BE49-F238E27FC236}">
@@ -27485,7 +27420,7 @@
         <p:spPr>
           <a:xfrm>
             <a:off x="4042437" y="4025145"/>
-            <a:ext cx="2013885" cy="307777"/>
+            <a:ext cx="1925592" cy="307777"/>
           </a:xfrm>
           <a:prstGeom prst="rect">
             <a:avLst/>
@@ -27503,7 +27438,7 @@
                   <a:srgbClr val="7030A0"/>
                 </a:solidFill>
               </a:rPr>
-              <a:t>PharmChainCompService</a:t>
+              <a:t>PharmChainMailService</a:t>
             </a:r>
             <a:endParaRPr lang="en-US" dirty="0">
               <a:solidFill>

</xml_diff>